<commit_message>
Dashboard - Home - Slider - Bienvenido - Staff de Docentes - Cursos y Talleres - Blog - Incluye boton Volver arriba
</commit_message>
<xml_diff>
--- a/static/img/UESJ.pptx
+++ b/static/img/UESJ.pptx
@@ -9,6 +9,10 @@
     <p:sldId id="257" r:id="rId3"/>
     <p:sldId id="258" r:id="rId4"/>
     <p:sldId id="259" r:id="rId5"/>
+    <p:sldId id="260" r:id="rId6"/>
+    <p:sldId id="261" r:id="rId7"/>
+    <p:sldId id="262" r:id="rId8"/>
+    <p:sldId id="263" r:id="rId9"/>
   </p:sldIdLst>
   <p:sldSz cx="12192000" cy="6858000"/>
   <p:notesSz cx="6858000" cy="9144000"/>
@@ -262,7 +266,7 @@
           <a:p>
             <a:fld id="{61C0A7A1-1656-4159-BA00-B5D52E614300}" type="datetimeFigureOut">
               <a:rPr lang="es-ES" smtClean="0"/>
-              <a:t>01/06/2024</a:t>
+              <a:t>04/06/2024</a:t>
             </a:fld>
             <a:endParaRPr lang="es-ES"/>
           </a:p>
@@ -460,7 +464,7 @@
           <a:p>
             <a:fld id="{61C0A7A1-1656-4159-BA00-B5D52E614300}" type="datetimeFigureOut">
               <a:rPr lang="es-ES" smtClean="0"/>
-              <a:t>01/06/2024</a:t>
+              <a:t>04/06/2024</a:t>
             </a:fld>
             <a:endParaRPr lang="es-ES"/>
           </a:p>
@@ -668,7 +672,7 @@
           <a:p>
             <a:fld id="{61C0A7A1-1656-4159-BA00-B5D52E614300}" type="datetimeFigureOut">
               <a:rPr lang="es-ES" smtClean="0"/>
-              <a:t>01/06/2024</a:t>
+              <a:t>04/06/2024</a:t>
             </a:fld>
             <a:endParaRPr lang="es-ES"/>
           </a:p>
@@ -866,7 +870,7 @@
           <a:p>
             <a:fld id="{61C0A7A1-1656-4159-BA00-B5D52E614300}" type="datetimeFigureOut">
               <a:rPr lang="es-ES" smtClean="0"/>
-              <a:t>01/06/2024</a:t>
+              <a:t>04/06/2024</a:t>
             </a:fld>
             <a:endParaRPr lang="es-ES"/>
           </a:p>
@@ -1141,7 +1145,7 @@
           <a:p>
             <a:fld id="{61C0A7A1-1656-4159-BA00-B5D52E614300}" type="datetimeFigureOut">
               <a:rPr lang="es-ES" smtClean="0"/>
-              <a:t>01/06/2024</a:t>
+              <a:t>04/06/2024</a:t>
             </a:fld>
             <a:endParaRPr lang="es-ES"/>
           </a:p>
@@ -1406,7 +1410,7 @@
           <a:p>
             <a:fld id="{61C0A7A1-1656-4159-BA00-B5D52E614300}" type="datetimeFigureOut">
               <a:rPr lang="es-ES" smtClean="0"/>
-              <a:t>01/06/2024</a:t>
+              <a:t>04/06/2024</a:t>
             </a:fld>
             <a:endParaRPr lang="es-ES"/>
           </a:p>
@@ -1818,7 +1822,7 @@
           <a:p>
             <a:fld id="{61C0A7A1-1656-4159-BA00-B5D52E614300}" type="datetimeFigureOut">
               <a:rPr lang="es-ES" smtClean="0"/>
-              <a:t>01/06/2024</a:t>
+              <a:t>04/06/2024</a:t>
             </a:fld>
             <a:endParaRPr lang="es-ES"/>
           </a:p>
@@ -1959,7 +1963,7 @@
           <a:p>
             <a:fld id="{61C0A7A1-1656-4159-BA00-B5D52E614300}" type="datetimeFigureOut">
               <a:rPr lang="es-ES" smtClean="0"/>
-              <a:t>01/06/2024</a:t>
+              <a:t>04/06/2024</a:t>
             </a:fld>
             <a:endParaRPr lang="es-ES"/>
           </a:p>
@@ -2072,7 +2076,7 @@
           <a:p>
             <a:fld id="{61C0A7A1-1656-4159-BA00-B5D52E614300}" type="datetimeFigureOut">
               <a:rPr lang="es-ES" smtClean="0"/>
-              <a:t>01/06/2024</a:t>
+              <a:t>04/06/2024</a:t>
             </a:fld>
             <a:endParaRPr lang="es-ES"/>
           </a:p>
@@ -2383,7 +2387,7 @@
           <a:p>
             <a:fld id="{61C0A7A1-1656-4159-BA00-B5D52E614300}" type="datetimeFigureOut">
               <a:rPr lang="es-ES" smtClean="0"/>
-              <a:t>01/06/2024</a:t>
+              <a:t>04/06/2024</a:t>
             </a:fld>
             <a:endParaRPr lang="es-ES"/>
           </a:p>
@@ -2671,7 +2675,7 @@
           <a:p>
             <a:fld id="{61C0A7A1-1656-4159-BA00-B5D52E614300}" type="datetimeFigureOut">
               <a:rPr lang="es-ES" smtClean="0"/>
-              <a:t>01/06/2024</a:t>
+              <a:t>04/06/2024</a:t>
             </a:fld>
             <a:endParaRPr lang="es-ES"/>
           </a:p>
@@ -2912,7 +2916,7 @@
           <a:p>
             <a:fld id="{61C0A7A1-1656-4159-BA00-B5D52E614300}" type="datetimeFigureOut">
               <a:rPr lang="es-ES" smtClean="0"/>
-              <a:t>01/06/2024</a:t>
+              <a:t>04/06/2024</a:t>
             </a:fld>
             <a:endParaRPr lang="es-ES"/>
           </a:p>
@@ -3419,6 +3423,473 @@
           </a:p>
         </p:txBody>
       </p:sp>
+      <p:pic>
+        <p:nvPicPr>
+          <p:cNvPr id="2" name="Imagen 1" descr="Qué es y cómo solucionar el aviso &quot;Defer Parsing JavaScript&quot; @ Ayuda  WordPress">
+            <a:extLst>
+              <a:ext uri="{FF2B5EF4-FFF2-40B4-BE49-F238E27FC236}">
+                <a16:creationId xmlns:a16="http://schemas.microsoft.com/office/drawing/2014/main" id="{ACF08F30-48B7-6999-60E0-0D22D5784146}"/>
+              </a:ext>
+            </a:extLst>
+          </p:cNvPr>
+          <p:cNvPicPr>
+            <a:picLocks noChangeAspect="1" noChangeArrowheads="1"/>
+          </p:cNvPicPr>
+          <p:nvPr/>
+        </p:nvPicPr>
+        <p:blipFill rotWithShape="1">
+          <a:blip r:embed="rId3">
+            <a:extLst>
+              <a:ext uri="{BEBA8EAE-BF5A-486C-A8C5-ECC9F3942E4B}">
+                <a14:imgProps xmlns:a14="http://schemas.microsoft.com/office/drawing/2010/main">
+                  <a14:imgLayer r:embed="rId4">
+                    <a14:imgEffect>
+                      <a14:backgroundRemoval t="6548" b="92857" l="28000" r="70667">
+                        <a14:foregroundMark x1="38667" y1="13690" x2="38667" y2="13690"/>
+                        <a14:foregroundMark x1="43667" y1="10714" x2="43667" y2="10714"/>
+                        <a14:foregroundMark x1="46000" y1="25595" x2="46000" y2="25595"/>
+                        <a14:foregroundMark x1="46667" y1="32143" x2="46667" y2="32143"/>
+                        <a14:foregroundMark x1="46333" y1="33333" x2="46333" y2="33333"/>
+                        <a14:foregroundMark x1="47667" y1="40476" x2="47667" y2="40476"/>
+                        <a14:foregroundMark x1="48000" y1="66071" x2="48000" y2="66071"/>
+                        <a14:foregroundMark x1="45667" y1="72619" x2="45667" y2="72619"/>
+                        <a14:foregroundMark x1="45000" y1="79167" x2="45000" y2="79167"/>
+                        <a14:foregroundMark x1="44333" y1="82738" x2="44333" y2="82738"/>
+                        <a14:foregroundMark x1="38333" y1="77381" x2="38333" y2="77381"/>
+                        <a14:foregroundMark x1="36333" y1="73810" x2="36333" y2="73810"/>
+                        <a14:foregroundMark x1="31333" y1="60119" x2="31000" y2="58333"/>
+                        <a14:foregroundMark x1="31000" y1="47619" x2="31000" y2="45833"/>
+                        <a14:foregroundMark x1="31333" y1="38690" x2="31333" y2="36310"/>
+                        <a14:foregroundMark x1="30667" y1="29762" x2="30333" y2="27381"/>
+                        <a14:foregroundMark x1="30667" y1="21429" x2="30667" y2="21429"/>
+                        <a14:foregroundMark x1="30000" y1="16071" x2="30000" y2="16071"/>
+                        <a14:foregroundMark x1="29333" y1="11905" x2="29333" y2="11905"/>
+                        <a14:foregroundMark x1="28000" y1="6548" x2="28000" y2="6548"/>
+                        <a14:foregroundMark x1="68667" y1="6548" x2="68667" y2="6548"/>
+                        <a14:foregroundMark x1="70667" y1="6548" x2="70667" y2="6548"/>
+                        <a14:foregroundMark x1="61000" y1="62500" x2="61000" y2="62500"/>
+                        <a14:foregroundMark x1="61333" y1="50595" x2="61333" y2="50595"/>
+                        <a14:foregroundMark x1="63333" y1="46429" x2="63333" y2="46429"/>
+                        <a14:foregroundMark x1="65000" y1="48214" x2="65000" y2="48214"/>
+                        <a14:foregroundMark x1="62667" y1="41071" x2="62667" y2="41071"/>
+                        <a14:foregroundMark x1="65000" y1="29167" x2="65000" y2="29167"/>
+                        <a14:foregroundMark x1="65333" y1="25595" x2="65333" y2="25595"/>
+                        <a14:foregroundMark x1="65000" y1="24405" x2="65000" y2="24405"/>
+                        <a14:foregroundMark x1="64000" y1="24405" x2="64000" y2="24405"/>
+                        <a14:foregroundMark x1="63000" y1="24405" x2="62667" y2="24405"/>
+                        <a14:foregroundMark x1="62333" y1="23810" x2="62000" y2="23810"/>
+                        <a14:foregroundMark x1="60333" y1="23810" x2="60333" y2="23810"/>
+                        <a14:foregroundMark x1="57667" y1="22619" x2="57667" y2="22619"/>
+                        <a14:foregroundMark x1="56667" y1="22619" x2="56667" y2="22619"/>
+                        <a14:foregroundMark x1="55333" y1="22619" x2="55333" y2="22619"/>
+                        <a14:foregroundMark x1="54000" y1="23214" x2="54000" y2="23214"/>
+                        <a14:foregroundMark x1="52333" y1="22619" x2="52333" y2="22619"/>
+                        <a14:foregroundMark x1="52667" y1="23810" x2="52667" y2="23810"/>
+                        <a14:foregroundMark x1="55333" y1="23214" x2="56667" y2="23214"/>
+                        <a14:foregroundMark x1="58333" y1="22619" x2="58333" y2="22619"/>
+                        <a14:foregroundMark x1="59667" y1="23214" x2="59667" y2="23214"/>
+                        <a14:foregroundMark x1="59000" y1="24405" x2="59000" y2="24405"/>
+                        <a14:foregroundMark x1="60000" y1="26786" x2="60000" y2="26786"/>
+                        <a14:foregroundMark x1="56000" y1="28571" x2="56000" y2="28571"/>
+                        <a14:foregroundMark x1="55333" y1="31548" x2="55333" y2="31548"/>
+                        <a14:foregroundMark x1="55000" y1="34524" x2="55000" y2="34524"/>
+                        <a14:foregroundMark x1="55000" y1="35714" x2="54667" y2="38095"/>
+                        <a14:foregroundMark x1="55000" y1="40476" x2="55000" y2="41667"/>
+                        <a14:foregroundMark x1="55000" y1="42857" x2="55000" y2="42857"/>
+                        <a14:foregroundMark x1="55000" y1="42857" x2="55000" y2="42857"/>
+                        <a14:foregroundMark x1="55000" y1="47024" x2="55000" y2="47024"/>
+                        <a14:foregroundMark x1="55000" y1="47024" x2="55000" y2="47024"/>
+                        <a14:foregroundMark x1="54333" y1="51190" x2="54333" y2="51190"/>
+                        <a14:foregroundMark x1="54333" y1="50000" x2="54667" y2="50000"/>
+                        <a14:foregroundMark x1="56333" y1="49405" x2="56333" y2="49405"/>
+                        <a14:foregroundMark x1="62667" y1="54167" x2="62667" y2="54167"/>
+                        <a14:foregroundMark x1="62667" y1="54167" x2="62333" y2="55952"/>
+                        <a14:foregroundMark x1="62333" y1="57143" x2="62333" y2="57143"/>
+                        <a14:foregroundMark x1="62000" y1="66071" x2="62000" y2="66071"/>
+                        <a14:foregroundMark x1="62000" y1="68452" x2="62000" y2="68452"/>
+                        <a14:foregroundMark x1="61667" y1="70238" x2="61000" y2="70238"/>
+                        <a14:foregroundMark x1="59000" y1="71429" x2="58333" y2="71429"/>
+                        <a14:foregroundMark x1="56667" y1="71429" x2="56333" y2="71429"/>
+                        <a14:foregroundMark x1="54333" y1="72024" x2="54333" y2="72024"/>
+                        <a14:foregroundMark x1="51333" y1="88690" x2="51333" y2="88690"/>
+                        <a14:foregroundMark x1="50667" y1="92857" x2="50667" y2="92857"/>
+                        <a14:foregroundMark x1="46333" y1="72024" x2="46333" y2="72024"/>
+                        <a14:foregroundMark x1="47333" y1="73810" x2="47333" y2="73810"/>
+                        <a14:foregroundMark x1="47667" y1="73810" x2="47667" y2="73810"/>
+                        <a14:foregroundMark x1="48333" y1="69048" x2="48333" y2="67857"/>
+                        <a14:foregroundMark x1="48000" y1="66071" x2="48000" y2="66071"/>
+                        <a14:foregroundMark x1="48000" y1="63690" x2="48000" y2="63690"/>
+                        <a14:foregroundMark x1="48000" y1="61905" x2="48000" y2="61905"/>
+                        <a14:foregroundMark x1="48000" y1="59524" x2="48000" y2="59524"/>
+                        <a14:foregroundMark x1="47667" y1="57143" x2="47667" y2="56548"/>
+                        <a14:foregroundMark x1="47667" y1="55357" x2="47667" y2="54762"/>
+                        <a14:foregroundMark x1="48000" y1="52381" x2="47667" y2="51190"/>
+                        <a14:foregroundMark x1="48000" y1="48214" x2="48000" y2="47024"/>
+                        <a14:foregroundMark x1="44000" y1="26190" x2="44000" y2="26190"/>
+                        <a14:foregroundMark x1="44000" y1="64881" x2="44000" y2="64881"/>
+                        <a14:foregroundMark x1="43000" y1="68452" x2="43000" y2="68452"/>
+                        <a14:foregroundMark x1="41000" y1="66071" x2="41000" y2="66071"/>
+                        <a14:foregroundMark x1="40000" y1="65476" x2="39333" y2="65476"/>
+                      </a14:backgroundRemoval>
+                    </a14:imgEffect>
+                  </a14:imgLayer>
+                </a14:imgProps>
+              </a:ext>
+              <a:ext uri="{28A0092B-C50C-407E-A947-70E740481C1C}">
+                <a14:useLocalDpi xmlns:a14="http://schemas.microsoft.com/office/drawing/2010/main" val="0"/>
+              </a:ext>
+            </a:extLst>
+          </a:blip>
+          <a:srcRect l="27287" t="4484" r="27184" b="5117"/>
+          <a:stretch/>
+        </p:blipFill>
+        <p:spPr bwMode="auto">
+          <a:xfrm>
+            <a:off x="9953247" y="703513"/>
+            <a:ext cx="1348033" cy="1498862"/>
+          </a:xfrm>
+          <a:prstGeom prst="rect">
+            <a:avLst/>
+          </a:prstGeom>
+          <a:ln>
+            <a:noFill/>
+          </a:ln>
+          <a:effectLst>
+            <a:outerShdw blurRad="190500" algn="tl" rotWithShape="0">
+              <a:srgbClr val="000000">
+                <a:alpha val="70000"/>
+              </a:srgbClr>
+            </a:outerShdw>
+          </a:effectLst>
+          <a:extLst>
+            <a:ext uri="{909E8E84-426E-40DD-AFC4-6F175D3DCCD1}">
+              <a14:hiddenFill xmlns:a14="http://schemas.microsoft.com/office/drawing/2010/main">
+                <a:solidFill>
+                  <a:srgbClr val="FFFFFF"/>
+                </a:solidFill>
+              </a14:hiddenFill>
+            </a:ext>
+          </a:extLst>
+        </p:spPr>
+      </p:pic>
+      <p:pic>
+        <p:nvPicPr>
+          <p:cNvPr id="3" name="Imagen 2" descr="Html 5 - Iconos gratis de redes sociales">
+            <a:extLst>
+              <a:ext uri="{FF2B5EF4-FFF2-40B4-BE49-F238E27FC236}">
+                <a16:creationId xmlns:a16="http://schemas.microsoft.com/office/drawing/2014/main" id="{D2E53FC8-09D1-47D1-A61A-1D4157EDB864}"/>
+              </a:ext>
+            </a:extLst>
+          </p:cNvPr>
+          <p:cNvPicPr>
+            <a:picLocks noChangeAspect="1" noChangeArrowheads="1"/>
+          </p:cNvPicPr>
+          <p:nvPr/>
+        </p:nvPicPr>
+        <p:blipFill>
+          <a:blip r:embed="rId5" cstate="print">
+            <a:extLst>
+              <a:ext uri="{BEBA8EAE-BF5A-486C-A8C5-ECC9F3942E4B}">
+                <a14:imgProps xmlns:a14="http://schemas.microsoft.com/office/drawing/2010/main">
+                  <a14:imgLayer r:embed="rId6">
+                    <a14:imgEffect>
+                      <a14:backgroundRemoval t="1778" b="96889" l="9778" r="89778">
+                        <a14:foregroundMark x1="50222" y1="7111" x2="50222" y2="7111"/>
+                        <a14:foregroundMark x1="75111" y1="5333" x2="75111" y2="5333"/>
+                        <a14:foregroundMark x1="88889" y1="5333" x2="88889" y2="5333"/>
+                        <a14:foregroundMark x1="85333" y1="21778" x2="85333" y2="21778"/>
+                        <a14:foregroundMark x1="86667" y1="32444" x2="86667" y2="34222"/>
+                        <a14:foregroundMark x1="85333" y1="43556" x2="85333" y2="43556"/>
+                        <a14:foregroundMark x1="85333" y1="60444" x2="85333" y2="62222"/>
+                        <a14:foregroundMark x1="84444" y1="70222" x2="84444" y2="70222"/>
+                        <a14:foregroundMark x1="80889" y1="77333" x2="80889" y2="77333"/>
+                        <a14:foregroundMark x1="73333" y1="88000" x2="73333" y2="88000"/>
+                        <a14:foregroundMark x1="11111" y1="9333" x2="11111" y2="9333"/>
+                        <a14:foregroundMark x1="10667" y1="2222" x2="10667" y2="2222"/>
+                        <a14:foregroundMark x1="52000" y1="96889" x2="52000" y2="96889"/>
+                        <a14:foregroundMark x1="47556" y1="23556" x2="47556" y2="23556"/>
+                        <a14:foregroundMark x1="57778" y1="24889" x2="57778" y2="24889"/>
+                        <a14:foregroundMark x1="73333" y1="23111" x2="73333" y2="23111"/>
+                        <a14:foregroundMark x1="73778" y1="20444" x2="73778" y2="20444"/>
+                        <a14:foregroundMark x1="32889" y1="21778" x2="32889" y2="21778"/>
+                        <a14:foregroundMark x1="26222" y1="21333" x2="26222" y2="21333"/>
+                        <a14:foregroundMark x1="26222" y1="30222" x2="26222" y2="30222"/>
+                        <a14:foregroundMark x1="30667" y1="42222" x2="30667" y2="42222"/>
+                        <a14:foregroundMark x1="36444" y1="46222" x2="36444" y2="46222"/>
+                        <a14:foregroundMark x1="47111" y1="46222" x2="47111" y2="46222"/>
+                        <a14:foregroundMark x1="57778" y1="46222" x2="57778" y2="46222"/>
+                        <a14:foregroundMark x1="68889" y1="46222" x2="68889" y2="46222"/>
+                        <a14:foregroundMark x1="75111" y1="42222" x2="75111" y2="42222"/>
+                        <a14:foregroundMark x1="72889" y1="51556" x2="72889" y2="51556"/>
+                        <a14:foregroundMark x1="68444" y1="55556" x2="68444" y2="55556"/>
+                        <a14:foregroundMark x1="69778" y1="64000" x2="69778" y2="64000"/>
+                        <a14:foregroundMark x1="68000" y1="68444" x2="68000" y2="68444"/>
+                        <a14:foregroundMark x1="58222" y1="72444" x2="58222" y2="72444"/>
+                        <a14:foregroundMark x1="46667" y1="73333" x2="46667" y2="73333"/>
+                        <a14:foregroundMark x1="36889" y1="69333" x2="36889" y2="69333"/>
+                        <a14:foregroundMark x1="32889" y1="66222" x2="32889" y2="66222"/>
+                        <a14:foregroundMark x1="28000" y1="60889" x2="28000" y2="60889"/>
+                        <a14:foregroundMark x1="32889" y1="59556" x2="32889" y2="59556"/>
+                        <a14:foregroundMark x1="27556" y1="47111" x2="27556" y2="47111"/>
+                        <a14:foregroundMark x1="28000" y1="39556" x2="28000" y2="39556"/>
+                        <a14:foregroundMark x1="30222" y1="27111" x2="30222" y2="27111"/>
+                        <a14:foregroundMark x1="28444" y1="20444" x2="28444" y2="20444"/>
+                        <a14:foregroundMark x1="35556" y1="21778" x2="35556" y2="21778"/>
+                        <a14:foregroundMark x1="39111" y1="21778" x2="39111" y2="21778"/>
+                        <a14:foregroundMark x1="54667" y1="22667" x2="54667" y2="22667"/>
+                        <a14:foregroundMark x1="61778" y1="22222" x2="61778" y2="22222"/>
+                        <a14:foregroundMark x1="69333" y1="21778" x2="69333" y2="21778"/>
+                        <a14:foregroundMark x1="69333" y1="23111" x2="69333" y2="23111"/>
+                        <a14:foregroundMark x1="66222" y1="26222" x2="66222" y2="26222"/>
+                        <a14:foregroundMark x1="63111" y1="26667" x2="63111" y2="26667"/>
+                        <a14:foregroundMark x1="60444" y1="24889" x2="60444" y2="24889"/>
+                        <a14:foregroundMark x1="54222" y1="26222" x2="54222" y2="26222"/>
+                        <a14:foregroundMark x1="50222" y1="26667" x2="50222" y2="26667"/>
+                        <a14:foregroundMark x1="46222" y1="22667" x2="43111" y2="22667"/>
+                        <a14:foregroundMark x1="30667" y1="30667" x2="30667" y2="30667"/>
+                        <a14:foregroundMark x1="31111" y1="34222" x2="31111" y2="34222"/>
+                        <a14:foregroundMark x1="27556" y1="37333" x2="27556" y2="37333"/>
+                        <a14:foregroundMark x1="26222" y1="43556" x2="26222" y2="43556"/>
+                        <a14:foregroundMark x1="32000" y1="47111" x2="32000" y2="47111"/>
+                        <a14:foregroundMark x1="41778" y1="43556" x2="41778" y2="43556"/>
+                        <a14:foregroundMark x1="39111" y1="46667" x2="39111" y2="46667"/>
+                        <a14:foregroundMark x1="42222" y1="48889" x2="42222" y2="48889"/>
+                        <a14:foregroundMark x1="49333" y1="48000" x2="49333" y2="48000"/>
+                        <a14:foregroundMark x1="52000" y1="44444" x2="52000" y2="44444"/>
+                        <a14:foregroundMark x1="60889" y1="44444" x2="60889" y2="44444"/>
+                        <a14:foregroundMark x1="54222" y1="49333" x2="54222" y2="49333"/>
+                        <a14:foregroundMark x1="63111" y1="48000" x2="63111" y2="48000"/>
+                        <a14:foregroundMark x1="64889" y1="44889" x2="64889" y2="44889"/>
+                        <a14:foregroundMark x1="69778" y1="45333" x2="69778" y2="45333"/>
+                        <a14:foregroundMark x1="68000" y1="53333" x2="68000" y2="53333"/>
+                        <a14:foregroundMark x1="71556" y1="57333" x2="71556" y2="57333"/>
+                        <a14:foregroundMark x1="67556" y1="62667" x2="67556" y2="62667"/>
+                        <a14:foregroundMark x1="67556" y1="67111" x2="67556" y2="67111"/>
+                        <a14:foregroundMark x1="66667" y1="72444" x2="66667" y2="72444"/>
+                        <a14:foregroundMark x1="65333" y1="69333" x2="65333" y2="69333"/>
+                        <a14:foregroundMark x1="65333" y1="74667" x2="65333" y2="74667"/>
+                        <a14:foregroundMark x1="62667" y1="71111" x2="62667" y2="71111"/>
+                        <a14:foregroundMark x1="56889" y1="71111" x2="56889" y2="71111"/>
+                        <a14:foregroundMark x1="56444" y1="76889" x2="56444" y2="76889"/>
+                        <a14:foregroundMark x1="52889" y1="73333" x2="52889" y2="73333"/>
+                        <a14:foregroundMark x1="48889" y1="78222" x2="48889" y2="78222"/>
+                        <a14:foregroundMark x1="53333" y1="78667" x2="53333" y2="78667"/>
+                        <a14:foregroundMark x1="44000" y1="71556" x2="44000" y2="71556"/>
+                        <a14:foregroundMark x1="40444" y1="76889" x2="40444" y2="76889"/>
+                        <a14:foregroundMark x1="37778" y1="71556" x2="37778" y2="71556"/>
+                      </a14:backgroundRemoval>
+                    </a14:imgEffect>
+                  </a14:imgLayer>
+                </a14:imgProps>
+              </a:ext>
+              <a:ext uri="{28A0092B-C50C-407E-A947-70E740481C1C}">
+                <a14:useLocalDpi xmlns:a14="http://schemas.microsoft.com/office/drawing/2010/main" val="0"/>
+              </a:ext>
+            </a:extLst>
+          </a:blip>
+          <a:srcRect/>
+          <a:stretch>
+            <a:fillRect/>
+          </a:stretch>
+        </p:blipFill>
+        <p:spPr bwMode="auto">
+          <a:xfrm>
+            <a:off x="9506932" y="2349744"/>
+            <a:ext cx="1514574" cy="1509914"/>
+          </a:xfrm>
+          <a:prstGeom prst="rect">
+            <a:avLst/>
+          </a:prstGeom>
+          <a:ln>
+            <a:noFill/>
+          </a:ln>
+          <a:effectLst>
+            <a:outerShdw blurRad="190500" algn="tl" rotWithShape="0">
+              <a:srgbClr val="000000">
+                <a:alpha val="70000"/>
+              </a:srgbClr>
+            </a:outerShdw>
+          </a:effectLst>
+          <a:extLst>
+            <a:ext uri="{909E8E84-426E-40DD-AFC4-6F175D3DCCD1}">
+              <a14:hiddenFill xmlns:a14="http://schemas.microsoft.com/office/drawing/2010/main">
+                <a:solidFill>
+                  <a:srgbClr val="FFFFFF"/>
+                </a:solidFill>
+              </a14:hiddenFill>
+            </a:ext>
+          </a:extLst>
+        </p:spPr>
+      </p:pic>
+      <p:pic>
+        <p:nvPicPr>
+          <p:cNvPr id="4" name="Imagen 3" descr="Cascading Style Sheets - Viquipèdia, l'enciclopèdia lliure">
+            <a:extLst>
+              <a:ext uri="{FF2B5EF4-FFF2-40B4-BE49-F238E27FC236}">
+                <a16:creationId xmlns:a16="http://schemas.microsoft.com/office/drawing/2014/main" id="{952F266E-C0DE-45CE-99C0-9137F8CA52AA}"/>
+              </a:ext>
+            </a:extLst>
+          </p:cNvPr>
+          <p:cNvPicPr>
+            <a:picLocks noChangeAspect="1" noChangeArrowheads="1"/>
+          </p:cNvPicPr>
+          <p:nvPr/>
+        </p:nvPicPr>
+        <p:blipFill>
+          <a:blip r:embed="rId7" cstate="print">
+            <a:extLst>
+              <a:ext uri="{BEBA8EAE-BF5A-486C-A8C5-ECC9F3942E4B}">
+                <a14:imgProps xmlns:a14="http://schemas.microsoft.com/office/drawing/2010/main">
+                  <a14:imgLayer r:embed="rId8">
+                    <a14:imgEffect>
+                      <a14:backgroundRemoval t="1778" b="99556" l="9778" r="90667">
+                        <a14:foregroundMark x1="20000" y1="8889" x2="20000" y2="8889"/>
+                        <a14:foregroundMark x1="41333" y1="9778" x2="41333" y2="9778"/>
+                        <a14:foregroundMark x1="77333" y1="3556" x2="77333" y2="3556"/>
+                        <a14:foregroundMark x1="89778" y1="4000" x2="89778" y2="4000"/>
+                        <a14:foregroundMark x1="91111" y1="2222" x2="91111" y2="2222"/>
+                        <a14:foregroundMark x1="41333" y1="22667" x2="41333" y2="22667"/>
+                        <a14:foregroundMark x1="30222" y1="24444" x2="30222" y2="24444"/>
+                        <a14:foregroundMark x1="25778" y1="21778" x2="25778" y2="21778"/>
+                        <a14:foregroundMark x1="54667" y1="21778" x2="54667" y2="21778"/>
+                        <a14:foregroundMark x1="52889" y1="20000" x2="52889" y2="20000"/>
+                        <a14:foregroundMark x1="59111" y1="20889" x2="59111" y2="20889"/>
+                        <a14:foregroundMark x1="65778" y1="20889" x2="65778" y2="20889"/>
+                        <a14:foregroundMark x1="69778" y1="20889" x2="69778" y2="20889"/>
+                        <a14:foregroundMark x1="74667" y1="20889" x2="74667" y2="20889"/>
+                        <a14:foregroundMark x1="72000" y1="30667" x2="72000" y2="30667"/>
+                        <a14:foregroundMark x1="69778" y1="36444" x2="69778" y2="36444"/>
+                        <a14:foregroundMark x1="70222" y1="40444" x2="70222" y2="40444"/>
+                        <a14:foregroundMark x1="70222" y1="45333" x2="70222" y2="45333"/>
+                        <a14:foregroundMark x1="66222" y1="46222" x2="66222" y2="46222"/>
+                        <a14:foregroundMark x1="59556" y1="45778" x2="59556" y2="45778"/>
+                        <a14:foregroundMark x1="64444" y1="43111" x2="64444" y2="43111"/>
+                        <a14:foregroundMark x1="57778" y1="45333" x2="56444" y2="45333"/>
+                        <a14:foregroundMark x1="42667" y1="44889" x2="42667" y2="44889"/>
+                        <a14:foregroundMark x1="68444" y1="56889" x2="68444" y2="56889"/>
+                        <a14:foregroundMark x1="68000" y1="60889" x2="68000" y2="60889"/>
+                        <a14:foregroundMark x1="65778" y1="68444" x2="65778" y2="68444"/>
+                        <a14:foregroundMark x1="76000" y1="18222" x2="76000" y2="18222"/>
+                        <a14:foregroundMark x1="74222" y1="18222" x2="74222" y2="18222"/>
+                        <a14:foregroundMark x1="72444" y1="18222" x2="72444" y2="18222"/>
+                        <a14:foregroundMark x1="69333" y1="18667" x2="69333" y2="18667"/>
+                        <a14:foregroundMark x1="70667" y1="18667" x2="70667" y2="18667"/>
+                        <a14:foregroundMark x1="73333" y1="18667" x2="73333" y2="18667"/>
+                        <a14:foregroundMark x1="67111" y1="18222" x2="67111" y2="18222"/>
+                        <a14:foregroundMark x1="62667" y1="18667" x2="62667" y2="18667"/>
+                        <a14:foregroundMark x1="58667" y1="18222" x2="58667" y2="18222"/>
+                        <a14:foregroundMark x1="54667" y1="18667" x2="54667" y2="18667"/>
+                        <a14:foregroundMark x1="48000" y1="18667" x2="48000" y2="18667"/>
+                        <a14:foregroundMark x1="42667" y1="19111" x2="42667" y2="19111"/>
+                        <a14:foregroundMark x1="29333" y1="19111" x2="29333" y2="19111"/>
+                        <a14:foregroundMark x1="23111" y1="19111" x2="23111" y2="19111"/>
+                        <a14:foregroundMark x1="24889" y1="19111" x2="24889" y2="19111"/>
+                        <a14:foregroundMark x1="28444" y1="18667" x2="28444" y2="18667"/>
+                        <a14:foregroundMark x1="31111" y1="18667" x2="31111" y2="18667"/>
+                        <a14:foregroundMark x1="33778" y1="18667" x2="33778" y2="18667"/>
+                        <a14:foregroundMark x1="36889" y1="18667" x2="36889" y2="18667"/>
+                        <a14:foregroundMark x1="42222" y1="18667" x2="42222" y2="18667"/>
+                        <a14:foregroundMark x1="46667" y1="18667" x2="46667" y2="18667"/>
+                        <a14:foregroundMark x1="55111" y1="20000" x2="55111" y2="20000"/>
+                        <a14:foregroundMark x1="59111" y1="21333" x2="59111" y2="21333"/>
+                        <a14:foregroundMark x1="59111" y1="23111" x2="59111" y2="23111"/>
+                        <a14:foregroundMark x1="69333" y1="22667" x2="69333" y2="22667"/>
+                        <a14:foregroundMark x1="73333" y1="24889" x2="73333" y2="24889"/>
+                        <a14:foregroundMark x1="70667" y1="43556" x2="71111" y2="44000"/>
+                        <a14:foregroundMark x1="74222" y1="48000" x2="74222" y2="48000"/>
+                        <a14:foregroundMark x1="72444" y1="52889" x2="72444" y2="52889"/>
+                        <a14:foregroundMark x1="73778" y1="56444" x2="73778" y2="56444"/>
+                        <a14:foregroundMark x1="72889" y1="59111" x2="72444" y2="60000"/>
+                        <a14:foregroundMark x1="72444" y1="61333" x2="72444" y2="61333"/>
+                        <a14:foregroundMark x1="71556" y1="66222" x2="71556" y2="66222"/>
+                        <a14:foregroundMark x1="71111" y1="69333" x2="71111" y2="69333"/>
+                        <a14:foregroundMark x1="71556" y1="72000" x2="71556" y2="72000"/>
+                        <a14:foregroundMark x1="71111" y1="73778" x2="71111" y2="73778"/>
+                        <a14:foregroundMark x1="68444" y1="75111" x2="68444" y2="75111"/>
+                        <a14:foregroundMark x1="65333" y1="76000" x2="63556" y2="76444"/>
+                        <a14:foregroundMark x1="59111" y1="78667" x2="59111" y2="78667"/>
+                        <a14:foregroundMark x1="56889" y1="79556" x2="54667" y2="80000"/>
+                        <a14:foregroundMark x1="51111" y1="80444" x2="51111" y2="80444"/>
+                        <a14:foregroundMark x1="57333" y1="79556" x2="58667" y2="79111"/>
+                        <a14:foregroundMark x1="64444" y1="77333" x2="64444" y2="77333"/>
+                        <a14:foregroundMark x1="63556" y1="76000" x2="63556" y2="76000"/>
+                        <a14:foregroundMark x1="61333" y1="77333" x2="61333" y2="77333"/>
+                        <a14:foregroundMark x1="58667" y1="77778" x2="58667" y2="77778"/>
+                        <a14:foregroundMark x1="56889" y1="77778" x2="56889" y2="77778"/>
+                        <a14:foregroundMark x1="52889" y1="78667" x2="52000" y2="78667"/>
+                        <a14:foregroundMark x1="52444" y1="78667" x2="52444" y2="78667"/>
+                        <a14:foregroundMark x1="48889" y1="79111" x2="48889" y2="79111"/>
+                        <a14:foregroundMark x1="45333" y1="78222" x2="45333" y2="78222"/>
+                        <a14:foregroundMark x1="41333" y1="76889" x2="41333" y2="76889"/>
+                        <a14:foregroundMark x1="38667" y1="76889" x2="38667" y2="76889"/>
+                        <a14:foregroundMark x1="33778" y1="74667" x2="33778" y2="74667"/>
+                        <a14:foregroundMark x1="31556" y1="74222" x2="30667" y2="73778"/>
+                        <a14:foregroundMark x1="37778" y1="75556" x2="37778" y2="75556"/>
+                        <a14:foregroundMark x1="33333" y1="69333" x2="32889" y2="68444"/>
+                        <a14:foregroundMark x1="32000" y1="61778" x2="32000" y2="61778"/>
+                        <a14:foregroundMark x1="26222" y1="45333" x2="26222" y2="45333"/>
+                        <a14:foregroundMark x1="25333" y1="41333" x2="25333" y2="41333"/>
+                        <a14:foregroundMark x1="26222" y1="41333" x2="26222" y2="41333"/>
+                        <a14:foregroundMark x1="28444" y1="41333" x2="28444" y2="41333"/>
+                        <a14:foregroundMark x1="31556" y1="41333" x2="31556" y2="41333"/>
+                        <a14:foregroundMark x1="34222" y1="40889" x2="34222" y2="40889"/>
+                        <a14:foregroundMark x1="37333" y1="40889" x2="37333" y2="40889"/>
+                        <a14:foregroundMark x1="40000" y1="40889" x2="40000" y2="40889"/>
+                        <a14:foregroundMark x1="41778" y1="41333" x2="41778" y2="41333"/>
+                        <a14:foregroundMark x1="46222" y1="40889" x2="46222" y2="40889"/>
+                        <a14:foregroundMark x1="48000" y1="40444" x2="48000" y2="40444"/>
+                        <a14:foregroundMark x1="60444" y1="52000" x2="60444" y2="52000"/>
+                        <a14:foregroundMark x1="56889" y1="52000" x2="55556" y2="52000"/>
+                        <a14:foregroundMark x1="52444" y1="52000" x2="52444" y2="52000"/>
+                        <a14:foregroundMark x1="49778" y1="52444" x2="48000" y2="52444"/>
+                        <a14:foregroundMark x1="44000" y1="51556" x2="44000" y2="51556"/>
+                        <a14:foregroundMark x1="52444" y1="96000" x2="52444" y2="96000"/>
+                        <a14:foregroundMark x1="51111" y1="99556" x2="51111" y2="99556"/>
+                        <a14:foregroundMark x1="50222" y1="99556" x2="50222" y2="99556"/>
+                      </a14:backgroundRemoval>
+                    </a14:imgEffect>
+                  </a14:imgLayer>
+                </a14:imgProps>
+              </a:ext>
+              <a:ext uri="{28A0092B-C50C-407E-A947-70E740481C1C}">
+                <a14:useLocalDpi xmlns:a14="http://schemas.microsoft.com/office/drawing/2010/main" val="0"/>
+              </a:ext>
+            </a:extLst>
+          </a:blip>
+          <a:srcRect/>
+          <a:stretch>
+            <a:fillRect/>
+          </a:stretch>
+        </p:blipFill>
+        <p:spPr bwMode="auto">
+          <a:xfrm>
+            <a:off x="9987445" y="4370415"/>
+            <a:ext cx="1514573" cy="1502359"/>
+          </a:xfrm>
+          <a:prstGeom prst="rect">
+            <a:avLst/>
+          </a:prstGeom>
+          <a:ln>
+            <a:noFill/>
+          </a:ln>
+          <a:effectLst>
+            <a:outerShdw blurRad="190500" algn="tl" rotWithShape="0">
+              <a:srgbClr val="000000">
+                <a:alpha val="70000"/>
+              </a:srgbClr>
+            </a:outerShdw>
+          </a:effectLst>
+          <a:extLst>
+            <a:ext uri="{909E8E84-426E-40DD-AFC4-6F175D3DCCD1}">
+              <a14:hiddenFill xmlns:a14="http://schemas.microsoft.com/office/drawing/2010/main">
+                <a:solidFill>
+                  <a:srgbClr val="FFFFFF"/>
+                </a:solidFill>
+              </a14:hiddenFill>
+            </a:ext>
+          </a:extLst>
+        </p:spPr>
+      </p:pic>
     </p:spTree>
     <p:extLst>
       <p:ext uri="{BB962C8B-B14F-4D97-AF65-F5344CB8AC3E}">
@@ -3463,7 +3934,7 @@
         </p:nvGrpSpPr>
         <p:grpSpPr>
           <a:xfrm>
-            <a:off x="3028801" y="841507"/>
+            <a:off x="1331977" y="266472"/>
             <a:ext cx="6057606" cy="4038404"/>
             <a:chOff x="3028801" y="841507"/>
             <a:chExt cx="6057606" cy="4038404"/>
@@ -3554,6 +4025,223 @@
           </p:txBody>
         </p:sp>
       </p:grpSp>
+      <p:pic>
+        <p:nvPicPr>
+          <p:cNvPr id="5" name="Imagen 4" descr="Guía para crear y organizar listas de tareas laborales | Sesame Assets">
+            <a:extLst>
+              <a:ext uri="{FF2B5EF4-FFF2-40B4-BE49-F238E27FC236}">
+                <a16:creationId xmlns:a16="http://schemas.microsoft.com/office/drawing/2014/main" id="{CAB9B38E-94C0-46AA-7A75-19B041D1A440}"/>
+              </a:ext>
+            </a:extLst>
+          </p:cNvPr>
+          <p:cNvPicPr>
+            <a:picLocks noChangeAspect="1" noChangeArrowheads="1"/>
+          </p:cNvPicPr>
+          <p:nvPr/>
+        </p:nvPicPr>
+        <p:blipFill>
+          <a:blip r:embed="rId3">
+            <a:extLst>
+              <a:ext uri="{28A0092B-C50C-407E-A947-70E740481C1C}">
+                <a14:useLocalDpi xmlns:a14="http://schemas.microsoft.com/office/drawing/2010/main" val="0"/>
+              </a:ext>
+            </a:extLst>
+          </a:blip>
+          <a:srcRect/>
+          <a:stretch>
+            <a:fillRect/>
+          </a:stretch>
+        </p:blipFill>
+        <p:spPr bwMode="auto">
+          <a:xfrm>
+            <a:off x="2692923" y="5431561"/>
+            <a:ext cx="2350951" cy="689428"/>
+          </a:xfrm>
+          <a:prstGeom prst="rect">
+            <a:avLst/>
+          </a:prstGeom>
+          <a:noFill/>
+          <a:extLst>
+            <a:ext uri="{909E8E84-426E-40DD-AFC4-6F175D3DCCD1}">
+              <a14:hiddenFill xmlns:a14="http://schemas.microsoft.com/office/drawing/2010/main">
+                <a:solidFill>
+                  <a:srgbClr val="FFFFFF"/>
+                </a:solidFill>
+              </a14:hiddenFill>
+            </a:ext>
+          </a:extLst>
+        </p:spPr>
+      </p:pic>
+      <p:grpSp>
+        <p:nvGrpSpPr>
+          <p:cNvPr id="7" name="Grupo 6">
+            <a:extLst>
+              <a:ext uri="{FF2B5EF4-FFF2-40B4-BE49-F238E27FC236}">
+                <a16:creationId xmlns:a16="http://schemas.microsoft.com/office/drawing/2014/main" id="{BB4C605A-A48E-9633-D72D-D2F33924DF66}"/>
+              </a:ext>
+            </a:extLst>
+          </p:cNvPr>
+          <p:cNvGrpSpPr/>
+          <p:nvPr/>
+        </p:nvGrpSpPr>
+        <p:grpSpPr>
+          <a:xfrm>
+            <a:off x="9301752" y="4904737"/>
+            <a:ext cx="2619375" cy="1743075"/>
+            <a:chOff x="9301752" y="4904737"/>
+            <a:chExt cx="2619375" cy="1743075"/>
+          </a:xfrm>
+        </p:grpSpPr>
+        <p:pic>
+          <p:nvPicPr>
+            <p:cNvPr id="1026" name="Picture 2" descr="Qué es y para qué sirve el desarrollo de software?. Programación en  Castellano.">
+              <a:extLst>
+                <a:ext uri="{FF2B5EF4-FFF2-40B4-BE49-F238E27FC236}">
+                  <a16:creationId xmlns:a16="http://schemas.microsoft.com/office/drawing/2014/main" id="{EC04A3FC-ABBD-1ACE-8006-9A72DC5EBBF3}"/>
+                </a:ext>
+              </a:extLst>
+            </p:cNvPr>
+            <p:cNvPicPr>
+              <a:picLocks noChangeAspect="1" noChangeArrowheads="1"/>
+            </p:cNvPicPr>
+            <p:nvPr/>
+          </p:nvPicPr>
+          <p:blipFill>
+            <a:blip r:embed="rId4">
+              <a:extLst>
+                <a:ext uri="{28A0092B-C50C-407E-A947-70E740481C1C}">
+                  <a14:useLocalDpi xmlns:a14="http://schemas.microsoft.com/office/drawing/2010/main" val="0"/>
+                </a:ext>
+              </a:extLst>
+            </a:blip>
+            <a:srcRect/>
+            <a:stretch>
+              <a:fillRect/>
+            </a:stretch>
+          </p:blipFill>
+          <p:spPr bwMode="auto">
+            <a:xfrm>
+              <a:off x="9301752" y="4904737"/>
+              <a:ext cx="2619375" cy="1743075"/>
+            </a:xfrm>
+            <a:prstGeom prst="rect">
+              <a:avLst/>
+            </a:prstGeom>
+            <a:noFill/>
+            <a:extLst>
+              <a:ext uri="{909E8E84-426E-40DD-AFC4-6F175D3DCCD1}">
+                <a14:hiddenFill xmlns:a14="http://schemas.microsoft.com/office/drawing/2010/main">
+                  <a:solidFill>
+                    <a:srgbClr val="FFFFFF"/>
+                  </a:solidFill>
+                </a14:hiddenFill>
+              </a:ext>
+            </a:extLst>
+          </p:spPr>
+        </p:pic>
+        <p:sp>
+          <p:nvSpPr>
+            <p:cNvPr id="6" name="Rectángulo 5">
+              <a:extLst>
+                <a:ext uri="{FF2B5EF4-FFF2-40B4-BE49-F238E27FC236}">
+                  <a16:creationId xmlns:a16="http://schemas.microsoft.com/office/drawing/2014/main" id="{DFE90BDE-02CF-274D-5DC7-812FF09F1E92}"/>
+                </a:ext>
+              </a:extLst>
+            </p:cNvPr>
+            <p:cNvSpPr/>
+            <p:nvPr/>
+          </p:nvSpPr>
+          <p:spPr>
+            <a:xfrm>
+              <a:off x="9301752" y="5431561"/>
+              <a:ext cx="2619374" cy="559175"/>
+            </a:xfrm>
+            <a:prstGeom prst="rect">
+              <a:avLst/>
+            </a:prstGeom>
+            <a:solidFill>
+              <a:schemeClr val="accent1">
+                <a:alpha val="76000"/>
+              </a:schemeClr>
+            </a:solidFill>
+            <a:ln>
+              <a:noFill/>
+            </a:ln>
+          </p:spPr>
+          <p:style>
+            <a:lnRef idx="2">
+              <a:schemeClr val="accent1">
+                <a:shade val="15000"/>
+              </a:schemeClr>
+            </a:lnRef>
+            <a:fillRef idx="1">
+              <a:schemeClr val="accent1"/>
+            </a:fillRef>
+            <a:effectRef idx="0">
+              <a:schemeClr val="accent1"/>
+            </a:effectRef>
+            <a:fontRef idx="minor">
+              <a:schemeClr val="lt1"/>
+            </a:fontRef>
+          </p:style>
+          <p:txBody>
+            <a:bodyPr rtlCol="0" anchor="ctr"/>
+            <a:lstStyle/>
+            <a:p>
+              <a:pPr algn="ctr"/>
+              <a:r>
+                <a:rPr lang="es-ES" sz="1600" dirty="0"/>
+                <a:t>DESARROLLO DE SISTEMAS</a:t>
+              </a:r>
+            </a:p>
+          </p:txBody>
+        </p:sp>
+      </p:grpSp>
+      <p:pic>
+        <p:nvPicPr>
+          <p:cNvPr id="1028" name="Picture 4" descr="Acelera! Recomendaciones para acelerar su aplicación Django - Swapps">
+            <a:extLst>
+              <a:ext uri="{FF2B5EF4-FFF2-40B4-BE49-F238E27FC236}">
+                <a16:creationId xmlns:a16="http://schemas.microsoft.com/office/drawing/2014/main" id="{C2D0F235-17C1-FA61-2818-FCC417C07C7D}"/>
+              </a:ext>
+            </a:extLst>
+          </p:cNvPr>
+          <p:cNvPicPr>
+            <a:picLocks noChangeAspect="1" noChangeArrowheads="1"/>
+          </p:cNvPicPr>
+          <p:nvPr/>
+        </p:nvPicPr>
+        <p:blipFill rotWithShape="1">
+          <a:blip r:embed="rId5">
+            <a:extLst>
+              <a:ext uri="{28A0092B-C50C-407E-A947-70E740481C1C}">
+                <a14:useLocalDpi xmlns:a14="http://schemas.microsoft.com/office/drawing/2010/main" val="0"/>
+              </a:ext>
+            </a:extLst>
+          </a:blip>
+          <a:srcRect l="23388" t="6554" r="11622" b="6849"/>
+          <a:stretch/>
+        </p:blipFill>
+        <p:spPr bwMode="auto">
+          <a:xfrm>
+            <a:off x="8832915" y="1659118"/>
+            <a:ext cx="1857081" cy="1385740"/>
+          </a:xfrm>
+          <a:prstGeom prst="rect">
+            <a:avLst/>
+          </a:prstGeom>
+          <a:noFill/>
+          <a:extLst>
+            <a:ext uri="{909E8E84-426E-40DD-AFC4-6F175D3DCCD1}">
+              <a14:hiddenFill xmlns:a14="http://schemas.microsoft.com/office/drawing/2010/main">
+                <a:solidFill>
+                  <a:srgbClr val="FFFFFF"/>
+                </a:solidFill>
+              </a14:hiddenFill>
+            </a:ext>
+          </a:extLst>
+        </p:spPr>
+      </p:pic>
     </p:spTree>
     <p:extLst>
       <p:ext uri="{BB962C8B-B14F-4D97-AF65-F5344CB8AC3E}">
@@ -3840,6 +4528,376 @@
     <p:extLst>
       <p:ext uri="{BB962C8B-B14F-4D97-AF65-F5344CB8AC3E}">
         <p14:creationId xmlns:p14="http://schemas.microsoft.com/office/powerpoint/2010/main" val="2135099019"/>
+      </p:ext>
+    </p:extLst>
+  </p:cSld>
+  <p:clrMapOvr>
+    <a:masterClrMapping/>
+  </p:clrMapOvr>
+</p:sld>
+</file>
+
+<file path=ppt/slides/slide5.xml><?xml version="1.0" encoding="utf-8"?>
+<p:sld xmlns:a="http://schemas.openxmlformats.org/drawingml/2006/main" xmlns:r="http://schemas.openxmlformats.org/officeDocument/2006/relationships" xmlns:p="http://schemas.openxmlformats.org/presentationml/2006/main">
+  <p:cSld>
+    <p:spTree>
+      <p:nvGrpSpPr>
+        <p:cNvPr id="1" name=""/>
+        <p:cNvGrpSpPr/>
+        <p:nvPr/>
+      </p:nvGrpSpPr>
+      <p:grpSpPr>
+        <a:xfrm>
+          <a:off x="0" y="0"/>
+          <a:ext cx="0" cy="0"/>
+          <a:chOff x="0" y="0"/>
+          <a:chExt cx="0" cy="0"/>
+        </a:xfrm>
+      </p:grpSpPr>
+      <p:pic>
+        <p:nvPicPr>
+          <p:cNvPr id="6" name="Imagen 5">
+            <a:extLst>
+              <a:ext uri="{FF2B5EF4-FFF2-40B4-BE49-F238E27FC236}">
+                <a16:creationId xmlns:a16="http://schemas.microsoft.com/office/drawing/2014/main" id="{3B8ADB0C-75A8-97A4-5404-AA81171F3B4D}"/>
+              </a:ext>
+            </a:extLst>
+          </p:cNvPr>
+          <p:cNvPicPr>
+            <a:picLocks noChangeAspect="1"/>
+          </p:cNvPicPr>
+          <p:nvPr/>
+        </p:nvPicPr>
+        <p:blipFill rotWithShape="1">
+          <a:blip r:embed="rId2">
+            <a:extLst>
+              <a:ext uri="{28A0092B-C50C-407E-A947-70E740481C1C}">
+                <a14:useLocalDpi xmlns:a14="http://schemas.microsoft.com/office/drawing/2010/main" val="0"/>
+              </a:ext>
+            </a:extLst>
+          </a:blip>
+          <a:srcRect t="4354" b="4018"/>
+          <a:stretch/>
+        </p:blipFill>
+        <p:spPr>
+          <a:xfrm>
+            <a:off x="546755" y="245096"/>
+            <a:ext cx="5731497" cy="3967049"/>
+          </a:xfrm>
+          <a:prstGeom prst="rect">
+            <a:avLst/>
+          </a:prstGeom>
+        </p:spPr>
+      </p:pic>
+      <p:pic>
+        <p:nvPicPr>
+          <p:cNvPr id="8" name="Imagen 7">
+            <a:extLst>
+              <a:ext uri="{FF2B5EF4-FFF2-40B4-BE49-F238E27FC236}">
+                <a16:creationId xmlns:a16="http://schemas.microsoft.com/office/drawing/2014/main" id="{B7EE39CA-25F9-EA5A-5324-D9D7E6223D18}"/>
+              </a:ext>
+            </a:extLst>
+          </p:cNvPr>
+          <p:cNvPicPr>
+            <a:picLocks noChangeAspect="1"/>
+          </p:cNvPicPr>
+          <p:nvPr/>
+        </p:nvPicPr>
+        <p:blipFill>
+          <a:blip r:embed="rId3">
+            <a:extLst>
+              <a:ext uri="{28A0092B-C50C-407E-A947-70E740481C1C}">
+                <a14:useLocalDpi xmlns:a14="http://schemas.microsoft.com/office/drawing/2010/main" val="0"/>
+              </a:ext>
+            </a:extLst>
+          </a:blip>
+          <a:stretch>
+            <a:fillRect/>
+          </a:stretch>
+        </p:blipFill>
+        <p:spPr>
+          <a:xfrm>
+            <a:off x="6460503" y="2890951"/>
+            <a:ext cx="5731497" cy="3967049"/>
+          </a:xfrm>
+          <a:prstGeom prst="rect">
+            <a:avLst/>
+          </a:prstGeom>
+        </p:spPr>
+      </p:pic>
+    </p:spTree>
+    <p:extLst>
+      <p:ext uri="{BB962C8B-B14F-4D97-AF65-F5344CB8AC3E}">
+        <p14:creationId xmlns:p14="http://schemas.microsoft.com/office/powerpoint/2010/main" val="2980482240"/>
+      </p:ext>
+    </p:extLst>
+  </p:cSld>
+  <p:clrMapOvr>
+    <a:masterClrMapping/>
+  </p:clrMapOvr>
+</p:sld>
+</file>
+
+<file path=ppt/slides/slide6.xml><?xml version="1.0" encoding="utf-8"?>
+<p:sld xmlns:a="http://schemas.openxmlformats.org/drawingml/2006/main" xmlns:r="http://schemas.openxmlformats.org/officeDocument/2006/relationships" xmlns:p="http://schemas.openxmlformats.org/presentationml/2006/main">
+  <p:cSld>
+    <p:spTree>
+      <p:nvGrpSpPr>
+        <p:cNvPr id="1" name=""/>
+        <p:cNvGrpSpPr/>
+        <p:nvPr/>
+      </p:nvGrpSpPr>
+      <p:grpSpPr>
+        <a:xfrm>
+          <a:off x="0" y="0"/>
+          <a:ext cx="0" cy="0"/>
+          <a:chOff x="0" y="0"/>
+          <a:chExt cx="0" cy="0"/>
+        </a:xfrm>
+      </p:grpSpPr>
+      <p:pic>
+        <p:nvPicPr>
+          <p:cNvPr id="3" name="Imagen 2">
+            <a:extLst>
+              <a:ext uri="{FF2B5EF4-FFF2-40B4-BE49-F238E27FC236}">
+                <a16:creationId xmlns:a16="http://schemas.microsoft.com/office/drawing/2014/main" id="{CCCDBAA0-4E20-39F3-45A3-33117505FD3D}"/>
+              </a:ext>
+            </a:extLst>
+          </p:cNvPr>
+          <p:cNvPicPr>
+            <a:picLocks noChangeAspect="1"/>
+          </p:cNvPicPr>
+          <p:nvPr/>
+        </p:nvPicPr>
+        <p:blipFill>
+          <a:blip r:embed="rId2">
+            <a:extLst>
+              <a:ext uri="{28A0092B-C50C-407E-A947-70E740481C1C}">
+                <a14:useLocalDpi xmlns:a14="http://schemas.microsoft.com/office/drawing/2010/main" val="0"/>
+              </a:ext>
+            </a:extLst>
+          </a:blip>
+          <a:stretch>
+            <a:fillRect/>
+          </a:stretch>
+        </p:blipFill>
+        <p:spPr>
+          <a:xfrm>
+            <a:off x="0" y="0"/>
+            <a:ext cx="5731497" cy="3967048"/>
+          </a:xfrm>
+          <a:prstGeom prst="rect">
+            <a:avLst/>
+          </a:prstGeom>
+        </p:spPr>
+      </p:pic>
+    </p:spTree>
+    <p:extLst>
+      <p:ext uri="{BB962C8B-B14F-4D97-AF65-F5344CB8AC3E}">
+        <p14:creationId xmlns:p14="http://schemas.microsoft.com/office/powerpoint/2010/main" val="3770620054"/>
+      </p:ext>
+    </p:extLst>
+  </p:cSld>
+  <p:clrMapOvr>
+    <a:masterClrMapping/>
+  </p:clrMapOvr>
+</p:sld>
+</file>
+
+<file path=ppt/slides/slide7.xml><?xml version="1.0" encoding="utf-8"?>
+<p:sld xmlns:a="http://schemas.openxmlformats.org/drawingml/2006/main" xmlns:r="http://schemas.openxmlformats.org/officeDocument/2006/relationships" xmlns:p="http://schemas.openxmlformats.org/presentationml/2006/main">
+  <p:cSld>
+    <p:spTree>
+      <p:nvGrpSpPr>
+        <p:cNvPr id="1" name=""/>
+        <p:cNvGrpSpPr/>
+        <p:nvPr/>
+      </p:nvGrpSpPr>
+      <p:grpSpPr>
+        <a:xfrm>
+          <a:off x="0" y="0"/>
+          <a:ext cx="0" cy="0"/>
+          <a:chOff x="0" y="0"/>
+          <a:chExt cx="0" cy="0"/>
+        </a:xfrm>
+      </p:grpSpPr>
+      <p:pic>
+        <p:nvPicPr>
+          <p:cNvPr id="6" name="Imagen 5">
+            <a:extLst>
+              <a:ext uri="{FF2B5EF4-FFF2-40B4-BE49-F238E27FC236}">
+                <a16:creationId xmlns:a16="http://schemas.microsoft.com/office/drawing/2014/main" id="{3B8ADB0C-75A8-97A4-5404-AA81171F3B4D}"/>
+              </a:ext>
+            </a:extLst>
+          </p:cNvPr>
+          <p:cNvPicPr>
+            <a:picLocks noChangeAspect="1"/>
+          </p:cNvPicPr>
+          <p:nvPr/>
+        </p:nvPicPr>
+        <p:blipFill rotWithShape="1">
+          <a:blip r:embed="rId2">
+            <a:extLst>
+              <a:ext uri="{28A0092B-C50C-407E-A947-70E740481C1C}">
+                <a14:useLocalDpi xmlns:a14="http://schemas.microsoft.com/office/drawing/2010/main" val="0"/>
+              </a:ext>
+            </a:extLst>
+          </a:blip>
+          <a:srcRect t="4354" b="4018"/>
+          <a:stretch/>
+        </p:blipFill>
+        <p:spPr>
+          <a:xfrm>
+            <a:off x="546755" y="245097"/>
+            <a:ext cx="5731497" cy="2771480"/>
+          </a:xfrm>
+          <a:prstGeom prst="rect">
+            <a:avLst/>
+          </a:prstGeom>
+        </p:spPr>
+      </p:pic>
+      <p:pic>
+        <p:nvPicPr>
+          <p:cNvPr id="8" name="Imagen 7">
+            <a:extLst>
+              <a:ext uri="{FF2B5EF4-FFF2-40B4-BE49-F238E27FC236}">
+                <a16:creationId xmlns:a16="http://schemas.microsoft.com/office/drawing/2014/main" id="{B7EE39CA-25F9-EA5A-5324-D9D7E6223D18}"/>
+              </a:ext>
+            </a:extLst>
+          </p:cNvPr>
+          <p:cNvPicPr>
+            <a:picLocks noChangeAspect="1"/>
+          </p:cNvPicPr>
+          <p:nvPr/>
+        </p:nvPicPr>
+        <p:blipFill>
+          <a:blip r:embed="rId3">
+            <a:extLst>
+              <a:ext uri="{28A0092B-C50C-407E-A947-70E740481C1C}">
+                <a14:useLocalDpi xmlns:a14="http://schemas.microsoft.com/office/drawing/2010/main" val="0"/>
+              </a:ext>
+            </a:extLst>
+          </a:blip>
+          <a:stretch>
+            <a:fillRect/>
+          </a:stretch>
+        </p:blipFill>
+        <p:spPr>
+          <a:xfrm>
+            <a:off x="6460503" y="4086520"/>
+            <a:ext cx="5731497" cy="2771480"/>
+          </a:xfrm>
+          <a:prstGeom prst="rect">
+            <a:avLst/>
+          </a:prstGeom>
+        </p:spPr>
+      </p:pic>
+    </p:spTree>
+    <p:extLst>
+      <p:ext uri="{BB962C8B-B14F-4D97-AF65-F5344CB8AC3E}">
+        <p14:creationId xmlns:p14="http://schemas.microsoft.com/office/powerpoint/2010/main" val="3311322288"/>
+      </p:ext>
+    </p:extLst>
+  </p:cSld>
+  <p:clrMapOvr>
+    <a:masterClrMapping/>
+  </p:clrMapOvr>
+</p:sld>
+</file>
+
+<file path=ppt/slides/slide8.xml><?xml version="1.0" encoding="utf-8"?>
+<p:sld xmlns:a="http://schemas.openxmlformats.org/drawingml/2006/main" xmlns:r="http://schemas.openxmlformats.org/officeDocument/2006/relationships" xmlns:p="http://schemas.openxmlformats.org/presentationml/2006/main">
+  <p:cSld>
+    <p:spTree>
+      <p:nvGrpSpPr>
+        <p:cNvPr id="1" name=""/>
+        <p:cNvGrpSpPr/>
+        <p:nvPr/>
+      </p:nvGrpSpPr>
+      <p:grpSpPr>
+        <a:xfrm>
+          <a:off x="0" y="0"/>
+          <a:ext cx="0" cy="0"/>
+          <a:chOff x="0" y="0"/>
+          <a:chExt cx="0" cy="0"/>
+        </a:xfrm>
+      </p:grpSpPr>
+      <p:pic>
+        <p:nvPicPr>
+          <p:cNvPr id="3" name="Imagen 2">
+            <a:extLst>
+              <a:ext uri="{FF2B5EF4-FFF2-40B4-BE49-F238E27FC236}">
+                <a16:creationId xmlns:a16="http://schemas.microsoft.com/office/drawing/2014/main" id="{CCCDBAA0-4E20-39F3-45A3-33117505FD3D}"/>
+              </a:ext>
+            </a:extLst>
+          </p:cNvPr>
+          <p:cNvPicPr>
+            <a:picLocks noChangeAspect="1"/>
+          </p:cNvPicPr>
+          <p:nvPr/>
+        </p:nvPicPr>
+        <p:blipFill>
+          <a:blip r:embed="rId2">
+            <a:extLst>
+              <a:ext uri="{28A0092B-C50C-407E-A947-70E740481C1C}">
+                <a14:useLocalDpi xmlns:a14="http://schemas.microsoft.com/office/drawing/2010/main" val="0"/>
+              </a:ext>
+            </a:extLst>
+          </a:blip>
+          <a:stretch>
+            <a:fillRect/>
+          </a:stretch>
+        </p:blipFill>
+        <p:spPr>
+          <a:xfrm>
+            <a:off x="0" y="0"/>
+            <a:ext cx="5731497" cy="2771480"/>
+          </a:xfrm>
+          <a:prstGeom prst="rect">
+            <a:avLst/>
+          </a:prstGeom>
+        </p:spPr>
+      </p:pic>
+      <p:pic>
+        <p:nvPicPr>
+          <p:cNvPr id="2" name="Imagen 1">
+            <a:extLst>
+              <a:ext uri="{FF2B5EF4-FFF2-40B4-BE49-F238E27FC236}">
+                <a16:creationId xmlns:a16="http://schemas.microsoft.com/office/drawing/2014/main" id="{9806CF1F-17E3-B3BC-6E7A-60928C66AC8B}"/>
+              </a:ext>
+            </a:extLst>
+          </p:cNvPr>
+          <p:cNvPicPr>
+            <a:picLocks noChangeAspect="1"/>
+          </p:cNvPicPr>
+          <p:nvPr/>
+        </p:nvPicPr>
+        <p:blipFill>
+          <a:blip r:embed="rId3">
+            <a:extLst>
+              <a:ext uri="{28A0092B-C50C-407E-A947-70E740481C1C}">
+                <a14:useLocalDpi xmlns:a14="http://schemas.microsoft.com/office/drawing/2010/main" val="0"/>
+              </a:ext>
+            </a:extLst>
+          </a:blip>
+          <a:stretch>
+            <a:fillRect/>
+          </a:stretch>
+        </p:blipFill>
+        <p:spPr>
+          <a:xfrm>
+            <a:off x="6096000" y="0"/>
+            <a:ext cx="5731497" cy="2771480"/>
+          </a:xfrm>
+          <a:prstGeom prst="rect">
+            <a:avLst/>
+          </a:prstGeom>
+        </p:spPr>
+      </p:pic>
+    </p:spTree>
+    <p:extLst>
+      <p:ext uri="{BB962C8B-B14F-4D97-AF65-F5344CB8AC3E}">
+        <p14:creationId xmlns:p14="http://schemas.microsoft.com/office/powerpoint/2010/main" val="3449742779"/>
       </p:ext>
     </p:extLst>
   </p:cSld>

</xml_diff>

<commit_message>
Dashboard - Actuallizacion de Menu de Opciones
</commit_message>
<xml_diff>
--- a/static/img/UESJ.pptx
+++ b/static/img/UESJ.pptx
@@ -13,6 +13,21 @@
     <p:sldId id="261" r:id="rId7"/>
     <p:sldId id="262" r:id="rId8"/>
     <p:sldId id="263" r:id="rId9"/>
+    <p:sldId id="264" r:id="rId10"/>
+    <p:sldId id="265" r:id="rId11"/>
+    <p:sldId id="270" r:id="rId12"/>
+    <p:sldId id="269" r:id="rId13"/>
+    <p:sldId id="268" r:id="rId14"/>
+    <p:sldId id="267" r:id="rId15"/>
+    <p:sldId id="266" r:id="rId16"/>
+    <p:sldId id="275" r:id="rId17"/>
+    <p:sldId id="274" r:id="rId18"/>
+    <p:sldId id="273" r:id="rId19"/>
+    <p:sldId id="278" r:id="rId20"/>
+    <p:sldId id="276" r:id="rId21"/>
+    <p:sldId id="277" r:id="rId22"/>
+    <p:sldId id="272" r:id="rId23"/>
+    <p:sldId id="271" r:id="rId24"/>
   </p:sldIdLst>
   <p:sldSz cx="12192000" cy="6858000"/>
   <p:notesSz cx="6858000" cy="9144000"/>
@@ -266,7 +281,7 @@
           <a:p>
             <a:fld id="{61C0A7A1-1656-4159-BA00-B5D52E614300}" type="datetimeFigureOut">
               <a:rPr lang="es-ES" smtClean="0"/>
-              <a:t>04/06/2024</a:t>
+              <a:t>16/06/2024</a:t>
             </a:fld>
             <a:endParaRPr lang="es-ES"/>
           </a:p>
@@ -464,7 +479,7 @@
           <a:p>
             <a:fld id="{61C0A7A1-1656-4159-BA00-B5D52E614300}" type="datetimeFigureOut">
               <a:rPr lang="es-ES" smtClean="0"/>
-              <a:t>04/06/2024</a:t>
+              <a:t>16/06/2024</a:t>
             </a:fld>
             <a:endParaRPr lang="es-ES"/>
           </a:p>
@@ -672,7 +687,7 @@
           <a:p>
             <a:fld id="{61C0A7A1-1656-4159-BA00-B5D52E614300}" type="datetimeFigureOut">
               <a:rPr lang="es-ES" smtClean="0"/>
-              <a:t>04/06/2024</a:t>
+              <a:t>16/06/2024</a:t>
             </a:fld>
             <a:endParaRPr lang="es-ES"/>
           </a:p>
@@ -870,7 +885,7 @@
           <a:p>
             <a:fld id="{61C0A7A1-1656-4159-BA00-B5D52E614300}" type="datetimeFigureOut">
               <a:rPr lang="es-ES" smtClean="0"/>
-              <a:t>04/06/2024</a:t>
+              <a:t>16/06/2024</a:t>
             </a:fld>
             <a:endParaRPr lang="es-ES"/>
           </a:p>
@@ -1145,7 +1160,7 @@
           <a:p>
             <a:fld id="{61C0A7A1-1656-4159-BA00-B5D52E614300}" type="datetimeFigureOut">
               <a:rPr lang="es-ES" smtClean="0"/>
-              <a:t>04/06/2024</a:t>
+              <a:t>16/06/2024</a:t>
             </a:fld>
             <a:endParaRPr lang="es-ES"/>
           </a:p>
@@ -1410,7 +1425,7 @@
           <a:p>
             <a:fld id="{61C0A7A1-1656-4159-BA00-B5D52E614300}" type="datetimeFigureOut">
               <a:rPr lang="es-ES" smtClean="0"/>
-              <a:t>04/06/2024</a:t>
+              <a:t>16/06/2024</a:t>
             </a:fld>
             <a:endParaRPr lang="es-ES"/>
           </a:p>
@@ -1822,7 +1837,7 @@
           <a:p>
             <a:fld id="{61C0A7A1-1656-4159-BA00-B5D52E614300}" type="datetimeFigureOut">
               <a:rPr lang="es-ES" smtClean="0"/>
-              <a:t>04/06/2024</a:t>
+              <a:t>16/06/2024</a:t>
             </a:fld>
             <a:endParaRPr lang="es-ES"/>
           </a:p>
@@ -1963,7 +1978,7 @@
           <a:p>
             <a:fld id="{61C0A7A1-1656-4159-BA00-B5D52E614300}" type="datetimeFigureOut">
               <a:rPr lang="es-ES" smtClean="0"/>
-              <a:t>04/06/2024</a:t>
+              <a:t>16/06/2024</a:t>
             </a:fld>
             <a:endParaRPr lang="es-ES"/>
           </a:p>
@@ -2076,7 +2091,7 @@
           <a:p>
             <a:fld id="{61C0A7A1-1656-4159-BA00-B5D52E614300}" type="datetimeFigureOut">
               <a:rPr lang="es-ES" smtClean="0"/>
-              <a:t>04/06/2024</a:t>
+              <a:t>16/06/2024</a:t>
             </a:fld>
             <a:endParaRPr lang="es-ES"/>
           </a:p>
@@ -2387,7 +2402,7 @@
           <a:p>
             <a:fld id="{61C0A7A1-1656-4159-BA00-B5D52E614300}" type="datetimeFigureOut">
               <a:rPr lang="es-ES" smtClean="0"/>
-              <a:t>04/06/2024</a:t>
+              <a:t>16/06/2024</a:t>
             </a:fld>
             <a:endParaRPr lang="es-ES"/>
           </a:p>
@@ -2675,7 +2690,7 @@
           <a:p>
             <a:fld id="{61C0A7A1-1656-4159-BA00-B5D52E614300}" type="datetimeFigureOut">
               <a:rPr lang="es-ES" smtClean="0"/>
-              <a:t>04/06/2024</a:t>
+              <a:t>16/06/2024</a:t>
             </a:fld>
             <a:endParaRPr lang="es-ES"/>
           </a:p>
@@ -2916,7 +2931,7 @@
           <a:p>
             <a:fld id="{61C0A7A1-1656-4159-BA00-B5D52E614300}" type="datetimeFigureOut">
               <a:rPr lang="es-ES" smtClean="0"/>
-              <a:t>04/06/2024</a:t>
+              <a:t>16/06/2024</a:t>
             </a:fld>
             <a:endParaRPr lang="es-ES"/>
           </a:p>
@@ -3903,6 +3918,666 @@
 </p:sld>
 </file>
 
+<file path=ppt/slides/slide10.xml><?xml version="1.0" encoding="utf-8"?>
+<p:sld xmlns:a="http://schemas.openxmlformats.org/drawingml/2006/main" xmlns:r="http://schemas.openxmlformats.org/officeDocument/2006/relationships" xmlns:p="http://schemas.openxmlformats.org/presentationml/2006/main">
+  <p:cSld>
+    <p:spTree>
+      <p:nvGrpSpPr>
+        <p:cNvPr id="1" name=""/>
+        <p:cNvGrpSpPr/>
+        <p:nvPr/>
+      </p:nvGrpSpPr>
+      <p:grpSpPr>
+        <a:xfrm>
+          <a:off x="0" y="0"/>
+          <a:ext cx="0" cy="0"/>
+          <a:chOff x="0" y="0"/>
+          <a:chExt cx="0" cy="0"/>
+        </a:xfrm>
+      </p:grpSpPr>
+      <p:pic>
+        <p:nvPicPr>
+          <p:cNvPr id="5" name="Imagen 4">
+            <a:extLst>
+              <a:ext uri="{FF2B5EF4-FFF2-40B4-BE49-F238E27FC236}">
+                <a16:creationId xmlns:a16="http://schemas.microsoft.com/office/drawing/2014/main" id="{1DFD1DB2-B111-EB4B-AAF3-7F07FB4DF428}"/>
+              </a:ext>
+            </a:extLst>
+          </p:cNvPr>
+          <p:cNvPicPr>
+            <a:picLocks noChangeAspect="1"/>
+          </p:cNvPicPr>
+          <p:nvPr/>
+        </p:nvPicPr>
+        <p:blipFill>
+          <a:blip r:embed="rId2">
+            <a:extLst>
+              <a:ext uri="{28A0092B-C50C-407E-A947-70E740481C1C}">
+                <a14:useLocalDpi xmlns:a14="http://schemas.microsoft.com/office/drawing/2010/main" val="0"/>
+              </a:ext>
+            </a:extLst>
+          </a:blip>
+          <a:stretch>
+            <a:fillRect/>
+          </a:stretch>
+        </p:blipFill>
+        <p:spPr>
+          <a:xfrm>
+            <a:off x="2876550" y="1282700"/>
+            <a:ext cx="6438900" cy="4292600"/>
+          </a:xfrm>
+          <a:prstGeom prst="rect">
+            <a:avLst/>
+          </a:prstGeom>
+        </p:spPr>
+      </p:pic>
+    </p:spTree>
+    <p:extLst>
+      <p:ext uri="{BB962C8B-B14F-4D97-AF65-F5344CB8AC3E}">
+        <p14:creationId xmlns:p14="http://schemas.microsoft.com/office/powerpoint/2010/main" val="2458047420"/>
+      </p:ext>
+    </p:extLst>
+  </p:cSld>
+  <p:clrMapOvr>
+    <a:masterClrMapping/>
+  </p:clrMapOvr>
+</p:sld>
+</file>
+
+<file path=ppt/slides/slide11.xml><?xml version="1.0" encoding="utf-8"?>
+<p:sld xmlns:a="http://schemas.openxmlformats.org/drawingml/2006/main" xmlns:r="http://schemas.openxmlformats.org/officeDocument/2006/relationships" xmlns:p="http://schemas.openxmlformats.org/presentationml/2006/main">
+  <p:cSld>
+    <p:spTree>
+      <p:nvGrpSpPr>
+        <p:cNvPr id="1" name=""/>
+        <p:cNvGrpSpPr/>
+        <p:nvPr/>
+      </p:nvGrpSpPr>
+      <p:grpSpPr>
+        <a:xfrm>
+          <a:off x="0" y="0"/>
+          <a:ext cx="0" cy="0"/>
+          <a:chOff x="0" y="0"/>
+          <a:chExt cx="0" cy="0"/>
+        </a:xfrm>
+      </p:grpSpPr>
+      <p:pic>
+        <p:nvPicPr>
+          <p:cNvPr id="3" name="Imagen 2">
+            <a:extLst>
+              <a:ext uri="{FF2B5EF4-FFF2-40B4-BE49-F238E27FC236}">
+                <a16:creationId xmlns:a16="http://schemas.microsoft.com/office/drawing/2014/main" id="{B83DB8E3-11B8-20EF-4D74-196C9309E8B1}"/>
+              </a:ext>
+            </a:extLst>
+          </p:cNvPr>
+          <p:cNvPicPr>
+            <a:picLocks noChangeAspect="1"/>
+          </p:cNvPicPr>
+          <p:nvPr/>
+        </p:nvPicPr>
+        <p:blipFill>
+          <a:blip r:embed="rId2">
+            <a:extLst>
+              <a:ext uri="{28A0092B-C50C-407E-A947-70E740481C1C}">
+                <a14:useLocalDpi xmlns:a14="http://schemas.microsoft.com/office/drawing/2010/main" val="0"/>
+              </a:ext>
+            </a:extLst>
+          </a:blip>
+          <a:stretch>
+            <a:fillRect/>
+          </a:stretch>
+        </p:blipFill>
+        <p:spPr>
+          <a:xfrm>
+            <a:off x="2584450" y="1454150"/>
+            <a:ext cx="7023100" cy="3949700"/>
+          </a:xfrm>
+          <a:prstGeom prst="rect">
+            <a:avLst/>
+          </a:prstGeom>
+        </p:spPr>
+      </p:pic>
+    </p:spTree>
+    <p:extLst>
+      <p:ext uri="{BB962C8B-B14F-4D97-AF65-F5344CB8AC3E}">
+        <p14:creationId xmlns:p14="http://schemas.microsoft.com/office/powerpoint/2010/main" val="558989574"/>
+      </p:ext>
+    </p:extLst>
+  </p:cSld>
+  <p:clrMapOvr>
+    <a:masterClrMapping/>
+  </p:clrMapOvr>
+</p:sld>
+</file>
+
+<file path=ppt/slides/slide12.xml><?xml version="1.0" encoding="utf-8"?>
+<p:sld xmlns:a="http://schemas.openxmlformats.org/drawingml/2006/main" xmlns:r="http://schemas.openxmlformats.org/officeDocument/2006/relationships" xmlns:p="http://schemas.openxmlformats.org/presentationml/2006/main">
+  <p:cSld>
+    <p:spTree>
+      <p:nvGrpSpPr>
+        <p:cNvPr id="1" name=""/>
+        <p:cNvGrpSpPr/>
+        <p:nvPr/>
+      </p:nvGrpSpPr>
+      <p:grpSpPr>
+        <a:xfrm>
+          <a:off x="0" y="0"/>
+          <a:ext cx="0" cy="0"/>
+          <a:chOff x="0" y="0"/>
+          <a:chExt cx="0" cy="0"/>
+        </a:xfrm>
+      </p:grpSpPr>
+      <p:pic>
+        <p:nvPicPr>
+          <p:cNvPr id="3" name="Imagen 2">
+            <a:extLst>
+              <a:ext uri="{FF2B5EF4-FFF2-40B4-BE49-F238E27FC236}">
+                <a16:creationId xmlns:a16="http://schemas.microsoft.com/office/drawing/2014/main" id="{3917A570-BC72-0F3B-F71A-9DB96A608655}"/>
+              </a:ext>
+            </a:extLst>
+          </p:cNvPr>
+          <p:cNvPicPr>
+            <a:picLocks noChangeAspect="1"/>
+          </p:cNvPicPr>
+          <p:nvPr/>
+        </p:nvPicPr>
+        <p:blipFill>
+          <a:blip r:embed="rId2">
+            <a:extLst>
+              <a:ext uri="{28A0092B-C50C-407E-A947-70E740481C1C}">
+                <a14:useLocalDpi xmlns:a14="http://schemas.microsoft.com/office/drawing/2010/main" val="0"/>
+              </a:ext>
+            </a:extLst>
+          </a:blip>
+          <a:stretch>
+            <a:fillRect/>
+          </a:stretch>
+        </p:blipFill>
+        <p:spPr>
+          <a:xfrm>
+            <a:off x="2863850" y="1276350"/>
+            <a:ext cx="6464300" cy="4305300"/>
+          </a:xfrm>
+          <a:prstGeom prst="rect">
+            <a:avLst/>
+          </a:prstGeom>
+        </p:spPr>
+      </p:pic>
+    </p:spTree>
+    <p:extLst>
+      <p:ext uri="{BB962C8B-B14F-4D97-AF65-F5344CB8AC3E}">
+        <p14:creationId xmlns:p14="http://schemas.microsoft.com/office/powerpoint/2010/main" val="1446607113"/>
+      </p:ext>
+    </p:extLst>
+  </p:cSld>
+  <p:clrMapOvr>
+    <a:masterClrMapping/>
+  </p:clrMapOvr>
+</p:sld>
+</file>
+
+<file path=ppt/slides/slide13.xml><?xml version="1.0" encoding="utf-8"?>
+<p:sld xmlns:a="http://schemas.openxmlformats.org/drawingml/2006/main" xmlns:r="http://schemas.openxmlformats.org/officeDocument/2006/relationships" xmlns:p="http://schemas.openxmlformats.org/presentationml/2006/main">
+  <p:cSld>
+    <p:spTree>
+      <p:nvGrpSpPr>
+        <p:cNvPr id="1" name=""/>
+        <p:cNvGrpSpPr/>
+        <p:nvPr/>
+      </p:nvGrpSpPr>
+      <p:grpSpPr>
+        <a:xfrm>
+          <a:off x="0" y="0"/>
+          <a:ext cx="0" cy="0"/>
+          <a:chOff x="0" y="0"/>
+          <a:chExt cx="0" cy="0"/>
+        </a:xfrm>
+      </p:grpSpPr>
+      <p:pic>
+        <p:nvPicPr>
+          <p:cNvPr id="3" name="Imagen 2">
+            <a:extLst>
+              <a:ext uri="{FF2B5EF4-FFF2-40B4-BE49-F238E27FC236}">
+                <a16:creationId xmlns:a16="http://schemas.microsoft.com/office/drawing/2014/main" id="{C741B510-BF43-8A59-6E08-CF05676BA24E}"/>
+              </a:ext>
+            </a:extLst>
+          </p:cNvPr>
+          <p:cNvPicPr>
+            <a:picLocks noChangeAspect="1"/>
+          </p:cNvPicPr>
+          <p:nvPr/>
+        </p:nvPicPr>
+        <p:blipFill>
+          <a:blip r:embed="rId2">
+            <a:extLst>
+              <a:ext uri="{28A0092B-C50C-407E-A947-70E740481C1C}">
+                <a14:useLocalDpi xmlns:a14="http://schemas.microsoft.com/office/drawing/2010/main" val="0"/>
+              </a:ext>
+            </a:extLst>
+          </a:blip>
+          <a:stretch>
+            <a:fillRect/>
+          </a:stretch>
+        </p:blipFill>
+        <p:spPr>
+          <a:xfrm>
+            <a:off x="2863850" y="1276350"/>
+            <a:ext cx="6464300" cy="4305300"/>
+          </a:xfrm>
+          <a:prstGeom prst="rect">
+            <a:avLst/>
+          </a:prstGeom>
+        </p:spPr>
+      </p:pic>
+    </p:spTree>
+    <p:extLst>
+      <p:ext uri="{BB962C8B-B14F-4D97-AF65-F5344CB8AC3E}">
+        <p14:creationId xmlns:p14="http://schemas.microsoft.com/office/powerpoint/2010/main" val="247343404"/>
+      </p:ext>
+    </p:extLst>
+  </p:cSld>
+  <p:clrMapOvr>
+    <a:masterClrMapping/>
+  </p:clrMapOvr>
+</p:sld>
+</file>
+
+<file path=ppt/slides/slide14.xml><?xml version="1.0" encoding="utf-8"?>
+<p:sld xmlns:a="http://schemas.openxmlformats.org/drawingml/2006/main" xmlns:r="http://schemas.openxmlformats.org/officeDocument/2006/relationships" xmlns:p="http://schemas.openxmlformats.org/presentationml/2006/main">
+  <p:cSld>
+    <p:spTree>
+      <p:nvGrpSpPr>
+        <p:cNvPr id="1" name=""/>
+        <p:cNvGrpSpPr/>
+        <p:nvPr/>
+      </p:nvGrpSpPr>
+      <p:grpSpPr>
+        <a:xfrm>
+          <a:off x="0" y="0"/>
+          <a:ext cx="0" cy="0"/>
+          <a:chOff x="0" y="0"/>
+          <a:chExt cx="0" cy="0"/>
+        </a:xfrm>
+      </p:grpSpPr>
+      <p:pic>
+        <p:nvPicPr>
+          <p:cNvPr id="3" name="Imagen 2">
+            <a:extLst>
+              <a:ext uri="{FF2B5EF4-FFF2-40B4-BE49-F238E27FC236}">
+                <a16:creationId xmlns:a16="http://schemas.microsoft.com/office/drawing/2014/main" id="{4E66B551-3872-B558-9BD0-960CECD69946}"/>
+              </a:ext>
+            </a:extLst>
+          </p:cNvPr>
+          <p:cNvPicPr>
+            <a:picLocks noChangeAspect="1"/>
+          </p:cNvPicPr>
+          <p:nvPr/>
+        </p:nvPicPr>
+        <p:blipFill>
+          <a:blip r:embed="rId2">
+            <a:extLst>
+              <a:ext uri="{28A0092B-C50C-407E-A947-70E740481C1C}">
+                <a14:useLocalDpi xmlns:a14="http://schemas.microsoft.com/office/drawing/2010/main" val="0"/>
+              </a:ext>
+            </a:extLst>
+          </a:blip>
+          <a:stretch>
+            <a:fillRect/>
+          </a:stretch>
+        </p:blipFill>
+        <p:spPr>
+          <a:xfrm>
+            <a:off x="2863850" y="1276350"/>
+            <a:ext cx="6464300" cy="4305300"/>
+          </a:xfrm>
+          <a:prstGeom prst="rect">
+            <a:avLst/>
+          </a:prstGeom>
+        </p:spPr>
+      </p:pic>
+    </p:spTree>
+    <p:extLst>
+      <p:ext uri="{BB962C8B-B14F-4D97-AF65-F5344CB8AC3E}">
+        <p14:creationId xmlns:p14="http://schemas.microsoft.com/office/powerpoint/2010/main" val="2957448135"/>
+      </p:ext>
+    </p:extLst>
+  </p:cSld>
+  <p:clrMapOvr>
+    <a:masterClrMapping/>
+  </p:clrMapOvr>
+</p:sld>
+</file>
+
+<file path=ppt/slides/slide15.xml><?xml version="1.0" encoding="utf-8"?>
+<p:sld xmlns:a="http://schemas.openxmlformats.org/drawingml/2006/main" xmlns:r="http://schemas.openxmlformats.org/officeDocument/2006/relationships" xmlns:p="http://schemas.openxmlformats.org/presentationml/2006/main">
+  <p:cSld>
+    <p:spTree>
+      <p:nvGrpSpPr>
+        <p:cNvPr id="1" name=""/>
+        <p:cNvGrpSpPr/>
+        <p:nvPr/>
+      </p:nvGrpSpPr>
+      <p:grpSpPr>
+        <a:xfrm>
+          <a:off x="0" y="0"/>
+          <a:ext cx="0" cy="0"/>
+          <a:chOff x="0" y="0"/>
+          <a:chExt cx="0" cy="0"/>
+        </a:xfrm>
+      </p:grpSpPr>
+      <p:pic>
+        <p:nvPicPr>
+          <p:cNvPr id="3" name="Imagen 2">
+            <a:extLst>
+              <a:ext uri="{FF2B5EF4-FFF2-40B4-BE49-F238E27FC236}">
+                <a16:creationId xmlns:a16="http://schemas.microsoft.com/office/drawing/2014/main" id="{4408D9DD-A5EE-B4F3-92E4-EC81E2BA3B07}"/>
+              </a:ext>
+            </a:extLst>
+          </p:cNvPr>
+          <p:cNvPicPr>
+            <a:picLocks noChangeAspect="1"/>
+          </p:cNvPicPr>
+          <p:nvPr/>
+        </p:nvPicPr>
+        <p:blipFill>
+          <a:blip r:embed="rId2">
+            <a:extLst>
+              <a:ext uri="{28A0092B-C50C-407E-A947-70E740481C1C}">
+                <a14:useLocalDpi xmlns:a14="http://schemas.microsoft.com/office/drawing/2010/main" val="0"/>
+              </a:ext>
+            </a:extLst>
+          </a:blip>
+          <a:stretch>
+            <a:fillRect/>
+          </a:stretch>
+        </p:blipFill>
+        <p:spPr>
+          <a:xfrm>
+            <a:off x="2863850" y="1276350"/>
+            <a:ext cx="6464300" cy="4305300"/>
+          </a:xfrm>
+          <a:prstGeom prst="rect">
+            <a:avLst/>
+          </a:prstGeom>
+        </p:spPr>
+      </p:pic>
+    </p:spTree>
+    <p:extLst>
+      <p:ext uri="{BB962C8B-B14F-4D97-AF65-F5344CB8AC3E}">
+        <p14:creationId xmlns:p14="http://schemas.microsoft.com/office/powerpoint/2010/main" val="2602743550"/>
+      </p:ext>
+    </p:extLst>
+  </p:cSld>
+  <p:clrMapOvr>
+    <a:masterClrMapping/>
+  </p:clrMapOvr>
+</p:sld>
+</file>
+
+<file path=ppt/slides/slide16.xml><?xml version="1.0" encoding="utf-8"?>
+<p:sld xmlns:a="http://schemas.openxmlformats.org/drawingml/2006/main" xmlns:r="http://schemas.openxmlformats.org/officeDocument/2006/relationships" xmlns:p="http://schemas.openxmlformats.org/presentationml/2006/main">
+  <p:cSld>
+    <p:spTree>
+      <p:nvGrpSpPr>
+        <p:cNvPr id="1" name=""/>
+        <p:cNvGrpSpPr/>
+        <p:nvPr/>
+      </p:nvGrpSpPr>
+      <p:grpSpPr>
+        <a:xfrm>
+          <a:off x="0" y="0"/>
+          <a:ext cx="0" cy="0"/>
+          <a:chOff x="0" y="0"/>
+          <a:chExt cx="0" cy="0"/>
+        </a:xfrm>
+      </p:grpSpPr>
+      <p:pic>
+        <p:nvPicPr>
+          <p:cNvPr id="3" name="Imagen 2">
+            <a:extLst>
+              <a:ext uri="{FF2B5EF4-FFF2-40B4-BE49-F238E27FC236}">
+                <a16:creationId xmlns:a16="http://schemas.microsoft.com/office/drawing/2014/main" id="{8B630D71-1392-143F-454C-FA2C94FD7A53}"/>
+              </a:ext>
+            </a:extLst>
+          </p:cNvPr>
+          <p:cNvPicPr>
+            <a:picLocks noChangeAspect="1"/>
+          </p:cNvPicPr>
+          <p:nvPr/>
+        </p:nvPicPr>
+        <p:blipFill>
+          <a:blip r:embed="rId2">
+            <a:extLst>
+              <a:ext uri="{28A0092B-C50C-407E-A947-70E740481C1C}">
+                <a14:useLocalDpi xmlns:a14="http://schemas.microsoft.com/office/drawing/2010/main" val="0"/>
+              </a:ext>
+            </a:extLst>
+          </a:blip>
+          <a:stretch>
+            <a:fillRect/>
+          </a:stretch>
+        </p:blipFill>
+        <p:spPr>
+          <a:xfrm>
+            <a:off x="2851150" y="1282700"/>
+            <a:ext cx="6489700" cy="4292600"/>
+          </a:xfrm>
+          <a:prstGeom prst="rect">
+            <a:avLst/>
+          </a:prstGeom>
+        </p:spPr>
+      </p:pic>
+    </p:spTree>
+    <p:extLst>
+      <p:ext uri="{BB962C8B-B14F-4D97-AF65-F5344CB8AC3E}">
+        <p14:creationId xmlns:p14="http://schemas.microsoft.com/office/powerpoint/2010/main" val="1203213174"/>
+      </p:ext>
+    </p:extLst>
+  </p:cSld>
+  <p:clrMapOvr>
+    <a:masterClrMapping/>
+  </p:clrMapOvr>
+</p:sld>
+</file>
+
+<file path=ppt/slides/slide17.xml><?xml version="1.0" encoding="utf-8"?>
+<p:sld xmlns:a="http://schemas.openxmlformats.org/drawingml/2006/main" xmlns:r="http://schemas.openxmlformats.org/officeDocument/2006/relationships" xmlns:p="http://schemas.openxmlformats.org/presentationml/2006/main">
+  <p:cSld>
+    <p:spTree>
+      <p:nvGrpSpPr>
+        <p:cNvPr id="1" name=""/>
+        <p:cNvGrpSpPr/>
+        <p:nvPr/>
+      </p:nvGrpSpPr>
+      <p:grpSpPr>
+        <a:xfrm>
+          <a:off x="0" y="0"/>
+          <a:ext cx="0" cy="0"/>
+          <a:chOff x="0" y="0"/>
+          <a:chExt cx="0" cy="0"/>
+        </a:xfrm>
+      </p:grpSpPr>
+      <p:pic>
+        <p:nvPicPr>
+          <p:cNvPr id="3" name="Imagen 2">
+            <a:extLst>
+              <a:ext uri="{FF2B5EF4-FFF2-40B4-BE49-F238E27FC236}">
+                <a16:creationId xmlns:a16="http://schemas.microsoft.com/office/drawing/2014/main" id="{2E42D5C6-FDAB-09C4-CBCC-F6275BD840A7}"/>
+              </a:ext>
+            </a:extLst>
+          </p:cNvPr>
+          <p:cNvPicPr>
+            <a:picLocks noChangeAspect="1"/>
+          </p:cNvPicPr>
+          <p:nvPr/>
+        </p:nvPicPr>
+        <p:blipFill>
+          <a:blip r:embed="rId2">
+            <a:extLst>
+              <a:ext uri="{28A0092B-C50C-407E-A947-70E740481C1C}">
+                <a14:useLocalDpi xmlns:a14="http://schemas.microsoft.com/office/drawing/2010/main" val="0"/>
+              </a:ext>
+            </a:extLst>
+          </a:blip>
+          <a:stretch>
+            <a:fillRect/>
+          </a:stretch>
+        </p:blipFill>
+        <p:spPr>
+          <a:xfrm>
+            <a:off x="2762250" y="1333500"/>
+            <a:ext cx="6667500" cy="4191000"/>
+          </a:xfrm>
+          <a:prstGeom prst="rect">
+            <a:avLst/>
+          </a:prstGeom>
+        </p:spPr>
+      </p:pic>
+    </p:spTree>
+    <p:extLst>
+      <p:ext uri="{BB962C8B-B14F-4D97-AF65-F5344CB8AC3E}">
+        <p14:creationId xmlns:p14="http://schemas.microsoft.com/office/powerpoint/2010/main" val="4211548573"/>
+      </p:ext>
+    </p:extLst>
+  </p:cSld>
+  <p:clrMapOvr>
+    <a:masterClrMapping/>
+  </p:clrMapOvr>
+</p:sld>
+</file>
+
+<file path=ppt/slides/slide18.xml><?xml version="1.0" encoding="utf-8"?>
+<p:sld xmlns:a="http://schemas.openxmlformats.org/drawingml/2006/main" xmlns:r="http://schemas.openxmlformats.org/officeDocument/2006/relationships" xmlns:p="http://schemas.openxmlformats.org/presentationml/2006/main">
+  <p:cSld>
+    <p:spTree>
+      <p:nvGrpSpPr>
+        <p:cNvPr id="1" name=""/>
+        <p:cNvGrpSpPr/>
+        <p:nvPr/>
+      </p:nvGrpSpPr>
+      <p:grpSpPr>
+        <a:xfrm>
+          <a:off x="0" y="0"/>
+          <a:ext cx="0" cy="0"/>
+          <a:chOff x="0" y="0"/>
+          <a:chExt cx="0" cy="0"/>
+        </a:xfrm>
+      </p:grpSpPr>
+      <p:pic>
+        <p:nvPicPr>
+          <p:cNvPr id="3" name="Imagen 2">
+            <a:extLst>
+              <a:ext uri="{FF2B5EF4-FFF2-40B4-BE49-F238E27FC236}">
+                <a16:creationId xmlns:a16="http://schemas.microsoft.com/office/drawing/2014/main" id="{F0D87928-46B0-230B-5DB9-00B1EB726877}"/>
+              </a:ext>
+            </a:extLst>
+          </p:cNvPr>
+          <p:cNvPicPr>
+            <a:picLocks noChangeAspect="1"/>
+          </p:cNvPicPr>
+          <p:nvPr/>
+        </p:nvPicPr>
+        <p:blipFill>
+          <a:blip r:embed="rId2">
+            <a:extLst>
+              <a:ext uri="{28A0092B-C50C-407E-A947-70E740481C1C}">
+                <a14:useLocalDpi xmlns:a14="http://schemas.microsoft.com/office/drawing/2010/main" val="0"/>
+              </a:ext>
+            </a:extLst>
+          </a:blip>
+          <a:stretch>
+            <a:fillRect/>
+          </a:stretch>
+        </p:blipFill>
+        <p:spPr>
+          <a:xfrm>
+            <a:off x="3022600" y="1155700"/>
+            <a:ext cx="6146800" cy="4546600"/>
+          </a:xfrm>
+          <a:prstGeom prst="rect">
+            <a:avLst/>
+          </a:prstGeom>
+        </p:spPr>
+      </p:pic>
+    </p:spTree>
+    <p:extLst>
+      <p:ext uri="{BB962C8B-B14F-4D97-AF65-F5344CB8AC3E}">
+        <p14:creationId xmlns:p14="http://schemas.microsoft.com/office/powerpoint/2010/main" val="3649093703"/>
+      </p:ext>
+    </p:extLst>
+  </p:cSld>
+  <p:clrMapOvr>
+    <a:masterClrMapping/>
+  </p:clrMapOvr>
+</p:sld>
+</file>
+
+<file path=ppt/slides/slide19.xml><?xml version="1.0" encoding="utf-8"?>
+<p:sld xmlns:a="http://schemas.openxmlformats.org/drawingml/2006/main" xmlns:r="http://schemas.openxmlformats.org/officeDocument/2006/relationships" xmlns:p="http://schemas.openxmlformats.org/presentationml/2006/main">
+  <p:cSld>
+    <p:spTree>
+      <p:nvGrpSpPr>
+        <p:cNvPr id="1" name=""/>
+        <p:cNvGrpSpPr/>
+        <p:nvPr/>
+      </p:nvGrpSpPr>
+      <p:grpSpPr>
+        <a:xfrm>
+          <a:off x="0" y="0"/>
+          <a:ext cx="0" cy="0"/>
+          <a:chOff x="0" y="0"/>
+          <a:chExt cx="0" cy="0"/>
+        </a:xfrm>
+      </p:grpSpPr>
+      <p:pic>
+        <p:nvPicPr>
+          <p:cNvPr id="3" name="Imagen 2">
+            <a:extLst>
+              <a:ext uri="{FF2B5EF4-FFF2-40B4-BE49-F238E27FC236}">
+                <a16:creationId xmlns:a16="http://schemas.microsoft.com/office/drawing/2014/main" id="{CCCDBAA0-4E20-39F3-45A3-33117505FD3D}"/>
+              </a:ext>
+            </a:extLst>
+          </p:cNvPr>
+          <p:cNvPicPr>
+            <a:picLocks/>
+          </p:cNvPicPr>
+          <p:nvPr/>
+        </p:nvPicPr>
+        <p:blipFill>
+          <a:blip r:embed="rId2">
+            <a:extLst>
+              <a:ext uri="{28A0092B-C50C-407E-A947-70E740481C1C}">
+                <a14:useLocalDpi xmlns:a14="http://schemas.microsoft.com/office/drawing/2010/main" val="0"/>
+              </a:ext>
+            </a:extLst>
+          </a:blip>
+          <a:stretch>
+            <a:fillRect/>
+          </a:stretch>
+        </p:blipFill>
+        <p:spPr>
+          <a:xfrm>
+            <a:off x="186612" y="392062"/>
+            <a:ext cx="10782000" cy="5824800"/>
+          </a:xfrm>
+          <a:prstGeom prst="rect">
+            <a:avLst/>
+          </a:prstGeom>
+        </p:spPr>
+      </p:pic>
+    </p:spTree>
+    <p:extLst>
+      <p:ext uri="{BB962C8B-B14F-4D97-AF65-F5344CB8AC3E}">
+        <p14:creationId xmlns:p14="http://schemas.microsoft.com/office/powerpoint/2010/main" val="3222987124"/>
+      </p:ext>
+    </p:extLst>
+  </p:cSld>
+  <p:clrMapOvr>
+    <a:masterClrMapping/>
+  </p:clrMapOvr>
+</p:sld>
+</file>
+
 <file path=ppt/slides/slide2.xml><?xml version="1.0" encoding="utf-8"?>
 <p:sld xmlns:a="http://schemas.openxmlformats.org/drawingml/2006/main" xmlns:r="http://schemas.openxmlformats.org/officeDocument/2006/relationships" xmlns:p="http://schemas.openxmlformats.org/presentationml/2006/main">
   <p:cSld>
@@ -4246,6 +4921,233 @@
     <p:extLst>
       <p:ext uri="{BB962C8B-B14F-4D97-AF65-F5344CB8AC3E}">
         <p14:creationId xmlns:p14="http://schemas.microsoft.com/office/powerpoint/2010/main" val="1589739535"/>
+      </p:ext>
+    </p:extLst>
+  </p:cSld>
+  <p:clrMapOvr>
+    <a:masterClrMapping/>
+  </p:clrMapOvr>
+</p:sld>
+</file>
+
+<file path=ppt/slides/slide20.xml><?xml version="1.0" encoding="utf-8"?>
+<p:sld xmlns:a="http://schemas.openxmlformats.org/drawingml/2006/main" xmlns:r="http://schemas.openxmlformats.org/officeDocument/2006/relationships" xmlns:p="http://schemas.openxmlformats.org/presentationml/2006/main">
+  <p:cSld>
+    <p:spTree>
+      <p:nvGrpSpPr>
+        <p:cNvPr id="1" name=""/>
+        <p:cNvGrpSpPr/>
+        <p:nvPr/>
+      </p:nvGrpSpPr>
+      <p:grpSpPr>
+        <a:xfrm>
+          <a:off x="0" y="0"/>
+          <a:ext cx="0" cy="0"/>
+          <a:chOff x="0" y="0"/>
+          <a:chExt cx="0" cy="0"/>
+        </a:xfrm>
+      </p:grpSpPr>
+      <p:pic>
+        <p:nvPicPr>
+          <p:cNvPr id="8" name="Imagen 7">
+            <a:extLst>
+              <a:ext uri="{FF2B5EF4-FFF2-40B4-BE49-F238E27FC236}">
+                <a16:creationId xmlns:a16="http://schemas.microsoft.com/office/drawing/2014/main" id="{B7EE39CA-25F9-EA5A-5324-D9D7E6223D18}"/>
+              </a:ext>
+            </a:extLst>
+          </p:cNvPr>
+          <p:cNvPicPr>
+            <a:picLocks noChangeAspect="1"/>
+          </p:cNvPicPr>
+          <p:nvPr/>
+        </p:nvPicPr>
+        <p:blipFill>
+          <a:blip r:embed="rId2">
+            <a:extLst>
+              <a:ext uri="{28A0092B-C50C-407E-A947-70E740481C1C}">
+                <a14:useLocalDpi xmlns:a14="http://schemas.microsoft.com/office/drawing/2010/main" val="0"/>
+              </a:ext>
+            </a:extLst>
+          </a:blip>
+          <a:stretch>
+            <a:fillRect/>
+          </a:stretch>
+        </p:blipFill>
+        <p:spPr>
+          <a:xfrm>
+            <a:off x="585893" y="516216"/>
+            <a:ext cx="10421628" cy="5825568"/>
+          </a:xfrm>
+          <a:prstGeom prst="rect">
+            <a:avLst/>
+          </a:prstGeom>
+        </p:spPr>
+      </p:pic>
+    </p:spTree>
+    <p:extLst>
+      <p:ext uri="{BB962C8B-B14F-4D97-AF65-F5344CB8AC3E}">
+        <p14:creationId xmlns:p14="http://schemas.microsoft.com/office/powerpoint/2010/main" val="3104212996"/>
+      </p:ext>
+    </p:extLst>
+  </p:cSld>
+  <p:clrMapOvr>
+    <a:masterClrMapping/>
+  </p:clrMapOvr>
+</p:sld>
+</file>
+
+<file path=ppt/slides/slide21.xml><?xml version="1.0" encoding="utf-8"?>
+<p:sld xmlns:a="http://schemas.openxmlformats.org/drawingml/2006/main" xmlns:r="http://schemas.openxmlformats.org/officeDocument/2006/relationships" xmlns:p="http://schemas.openxmlformats.org/presentationml/2006/main">
+  <p:cSld>
+    <p:spTree>
+      <p:nvGrpSpPr>
+        <p:cNvPr id="1" name=""/>
+        <p:cNvGrpSpPr/>
+        <p:nvPr/>
+      </p:nvGrpSpPr>
+      <p:grpSpPr>
+        <a:xfrm>
+          <a:off x="0" y="0"/>
+          <a:ext cx="0" cy="0"/>
+          <a:chOff x="0" y="0"/>
+          <a:chExt cx="0" cy="0"/>
+        </a:xfrm>
+      </p:grpSpPr>
+      <p:pic>
+        <p:nvPicPr>
+          <p:cNvPr id="6" name="Imagen 5">
+            <a:extLst>
+              <a:ext uri="{FF2B5EF4-FFF2-40B4-BE49-F238E27FC236}">
+                <a16:creationId xmlns:a16="http://schemas.microsoft.com/office/drawing/2014/main" id="{3B8ADB0C-75A8-97A4-5404-AA81171F3B4D}"/>
+              </a:ext>
+            </a:extLst>
+          </p:cNvPr>
+          <p:cNvPicPr>
+            <a:picLocks/>
+          </p:cNvPicPr>
+          <p:nvPr/>
+        </p:nvPicPr>
+        <p:blipFill rotWithShape="1">
+          <a:blip r:embed="rId2">
+            <a:extLst>
+              <a:ext uri="{28A0092B-C50C-407E-A947-70E740481C1C}">
+                <a14:useLocalDpi xmlns:a14="http://schemas.microsoft.com/office/drawing/2010/main" val="0"/>
+              </a:ext>
+            </a:extLst>
+          </a:blip>
+          <a:srcRect t="4354" b="4018"/>
+          <a:stretch/>
+        </p:blipFill>
+        <p:spPr>
+          <a:xfrm>
+            <a:off x="594379" y="716113"/>
+            <a:ext cx="10422000" cy="5824800"/>
+          </a:xfrm>
+          <a:prstGeom prst="rect">
+            <a:avLst/>
+          </a:prstGeom>
+        </p:spPr>
+      </p:pic>
+    </p:spTree>
+    <p:extLst>
+      <p:ext uri="{BB962C8B-B14F-4D97-AF65-F5344CB8AC3E}">
+        <p14:creationId xmlns:p14="http://schemas.microsoft.com/office/powerpoint/2010/main" val="3607610467"/>
+      </p:ext>
+    </p:extLst>
+  </p:cSld>
+  <p:clrMapOvr>
+    <a:masterClrMapping/>
+  </p:clrMapOvr>
+</p:sld>
+</file>
+
+<file path=ppt/slides/slide22.xml><?xml version="1.0" encoding="utf-8"?>
+<p:sld xmlns:a="http://schemas.openxmlformats.org/drawingml/2006/main" xmlns:r="http://schemas.openxmlformats.org/officeDocument/2006/relationships" xmlns:p="http://schemas.openxmlformats.org/presentationml/2006/main">
+  <p:cSld>
+    <p:spTree>
+      <p:nvGrpSpPr>
+        <p:cNvPr id="1" name=""/>
+        <p:cNvGrpSpPr/>
+        <p:nvPr/>
+      </p:nvGrpSpPr>
+      <p:grpSpPr>
+        <a:xfrm>
+          <a:off x="0" y="0"/>
+          <a:ext cx="0" cy="0"/>
+          <a:chOff x="0" y="0"/>
+          <a:chExt cx="0" cy="0"/>
+        </a:xfrm>
+      </p:grpSpPr>
+      <p:pic>
+        <p:nvPicPr>
+          <p:cNvPr id="3" name="Imagen 2">
+            <a:extLst>
+              <a:ext uri="{FF2B5EF4-FFF2-40B4-BE49-F238E27FC236}">
+                <a16:creationId xmlns:a16="http://schemas.microsoft.com/office/drawing/2014/main" id="{60FA9B61-3BD5-C879-841F-F20A87B34BD1}"/>
+              </a:ext>
+            </a:extLst>
+          </p:cNvPr>
+          <p:cNvPicPr>
+            <a:picLocks noChangeAspect="1"/>
+          </p:cNvPicPr>
+          <p:nvPr/>
+        </p:nvPicPr>
+        <p:blipFill>
+          <a:blip r:embed="rId2">
+            <a:extLst>
+              <a:ext uri="{28A0092B-C50C-407E-A947-70E740481C1C}">
+                <a14:useLocalDpi xmlns:a14="http://schemas.microsoft.com/office/drawing/2010/main" val="0"/>
+              </a:ext>
+            </a:extLst>
+          </a:blip>
+          <a:stretch>
+            <a:fillRect/>
+          </a:stretch>
+        </p:blipFill>
+        <p:spPr>
+          <a:xfrm>
+            <a:off x="3114675" y="447675"/>
+            <a:ext cx="5962650" cy="5962650"/>
+          </a:xfrm>
+          <a:prstGeom prst="rect">
+            <a:avLst/>
+          </a:prstGeom>
+        </p:spPr>
+      </p:pic>
+    </p:spTree>
+    <p:extLst>
+      <p:ext uri="{BB962C8B-B14F-4D97-AF65-F5344CB8AC3E}">
+        <p14:creationId xmlns:p14="http://schemas.microsoft.com/office/powerpoint/2010/main" val="1319675079"/>
+      </p:ext>
+    </p:extLst>
+  </p:cSld>
+  <p:clrMapOvr>
+    <a:masterClrMapping/>
+  </p:clrMapOvr>
+</p:sld>
+</file>
+
+<file path=ppt/slides/slide23.xml><?xml version="1.0" encoding="utf-8"?>
+<p:sld xmlns:a="http://schemas.openxmlformats.org/drawingml/2006/main" xmlns:r="http://schemas.openxmlformats.org/officeDocument/2006/relationships" xmlns:p="http://schemas.openxmlformats.org/presentationml/2006/main">
+  <p:cSld>
+    <p:spTree>
+      <p:nvGrpSpPr>
+        <p:cNvPr id="1" name=""/>
+        <p:cNvGrpSpPr/>
+        <p:nvPr/>
+      </p:nvGrpSpPr>
+      <p:grpSpPr>
+        <a:xfrm>
+          <a:off x="0" y="0"/>
+          <a:ext cx="0" cy="0"/>
+          <a:chOff x="0" y="0"/>
+          <a:chExt cx="0" cy="0"/>
+        </a:xfrm>
+      </p:grpSpPr>
+    </p:spTree>
+    <p:extLst>
+      <p:ext uri="{BB962C8B-B14F-4D97-AF65-F5344CB8AC3E}">
+        <p14:creationId xmlns:p14="http://schemas.microsoft.com/office/powerpoint/2010/main" val="2037130956"/>
       </p:ext>
     </p:extLst>
   </p:cSld>
@@ -4413,117 +5315,96 @@
           <a:chExt cx="0" cy="0"/>
         </a:xfrm>
       </p:grpSpPr>
-      <p:grpSp>
-        <p:nvGrpSpPr>
-          <p:cNvPr id="5" name="Grupo 4">
-            <a:extLst>
-              <a:ext uri="{FF2B5EF4-FFF2-40B4-BE49-F238E27FC236}">
-                <a16:creationId xmlns:a16="http://schemas.microsoft.com/office/drawing/2014/main" id="{EA1DBFE3-80E9-4019-9E8A-2275584BBF8F}"/>
-              </a:ext>
-            </a:extLst>
-          </p:cNvPr>
-          <p:cNvGrpSpPr/>
+      <p:pic>
+        <p:nvPicPr>
+          <p:cNvPr id="4" name="Imagen 3">
+            <a:extLst>
+              <a:ext uri="{FF2B5EF4-FFF2-40B4-BE49-F238E27FC236}">
+                <a16:creationId xmlns:a16="http://schemas.microsoft.com/office/drawing/2014/main" id="{C8E97127-34BA-9A4E-C8DF-E3863BFC77C2}"/>
+              </a:ext>
+            </a:extLst>
+          </p:cNvPr>
+          <p:cNvPicPr>
+            <a:picLocks noChangeAspect="1"/>
+          </p:cNvPicPr>
           <p:nvPr/>
-        </p:nvGrpSpPr>
-        <p:grpSpPr>
+        </p:nvPicPr>
+        <p:blipFill>
+          <a:blip r:embed="rId2">
+            <a:extLst>
+              <a:ext uri="{28A0092B-C50C-407E-A947-70E740481C1C}">
+                <a14:useLocalDpi xmlns:a14="http://schemas.microsoft.com/office/drawing/2010/main" val="0"/>
+              </a:ext>
+            </a:extLst>
+          </a:blip>
+          <a:stretch>
+            <a:fillRect/>
+          </a:stretch>
+        </p:blipFill>
+        <p:spPr>
           <a:xfrm>
             <a:off x="3198480" y="1584357"/>
-            <a:ext cx="6057606" cy="4038405"/>
-            <a:chOff x="3198480" y="1584357"/>
-            <a:chExt cx="6057606" cy="4038405"/>
+            <a:ext cx="6057605" cy="4038403"/>
           </a:xfrm>
-        </p:grpSpPr>
-        <p:pic>
-          <p:nvPicPr>
-            <p:cNvPr id="4" name="Imagen 3">
-              <a:extLst>
-                <a:ext uri="{FF2B5EF4-FFF2-40B4-BE49-F238E27FC236}">
-                  <a16:creationId xmlns:a16="http://schemas.microsoft.com/office/drawing/2014/main" id="{C8E97127-34BA-9A4E-C8DF-E3863BFC77C2}"/>
-                </a:ext>
-              </a:extLst>
-            </p:cNvPr>
-            <p:cNvPicPr>
-              <a:picLocks noChangeAspect="1"/>
-            </p:cNvPicPr>
-            <p:nvPr/>
-          </p:nvPicPr>
-          <p:blipFill>
-            <a:blip r:embed="rId2">
-              <a:extLst>
-                <a:ext uri="{28A0092B-C50C-407E-A947-70E740481C1C}">
-                  <a14:useLocalDpi xmlns:a14="http://schemas.microsoft.com/office/drawing/2010/main" val="0"/>
-                </a:ext>
-              </a:extLst>
-            </a:blip>
-            <a:stretch>
-              <a:fillRect/>
-            </a:stretch>
-          </p:blipFill>
-          <p:spPr>
-            <a:xfrm>
-              <a:off x="3198480" y="1584357"/>
-              <a:ext cx="6057605" cy="4038403"/>
-            </a:xfrm>
-            <a:prstGeom prst="rect">
-              <a:avLst/>
-            </a:prstGeom>
-          </p:spPr>
-        </p:pic>
-        <p:sp>
-          <p:nvSpPr>
-            <p:cNvPr id="3" name="Rectángulo 2">
-              <a:extLst>
-                <a:ext uri="{FF2B5EF4-FFF2-40B4-BE49-F238E27FC236}">
-                  <a16:creationId xmlns:a16="http://schemas.microsoft.com/office/drawing/2014/main" id="{C47728CA-743B-1492-A50B-B5F3DAA2599D}"/>
-                </a:ext>
-              </a:extLst>
-            </p:cNvPr>
-            <p:cNvSpPr/>
-            <p:nvPr/>
-          </p:nvSpPr>
-          <p:spPr>
-            <a:xfrm>
-              <a:off x="3198481" y="1584358"/>
-              <a:ext cx="6057605" cy="4038404"/>
-            </a:xfrm>
-            <a:prstGeom prst="rect">
-              <a:avLst/>
-            </a:prstGeom>
-            <a:solidFill>
-              <a:schemeClr val="dk1">
-                <a:alpha val="64000"/>
-              </a:schemeClr>
-            </a:solidFill>
-            <a:ln>
-              <a:noFill/>
-            </a:ln>
-          </p:spPr>
-          <p:style>
-            <a:lnRef idx="2">
-              <a:schemeClr val="dk1">
-                <a:shade val="15000"/>
-              </a:schemeClr>
-            </a:lnRef>
-            <a:fillRef idx="1">
-              <a:schemeClr val="dk1"/>
-            </a:fillRef>
-            <a:effectRef idx="0">
-              <a:schemeClr val="dk1"/>
-            </a:effectRef>
-            <a:fontRef idx="minor">
-              <a:schemeClr val="lt1"/>
-            </a:fontRef>
-          </p:style>
-          <p:txBody>
-            <a:bodyPr rtlCol="0" anchor="ctr"/>
-            <a:lstStyle/>
-            <a:p>
-              <a:pPr algn="ctr"/>
-              <a:endParaRPr lang="es-ES"/>
-            </a:p>
-          </p:txBody>
-        </p:sp>
-      </p:grpSp>
+          <a:prstGeom prst="rect">
+            <a:avLst/>
+          </a:prstGeom>
+        </p:spPr>
+      </p:pic>
+      <p:sp>
+        <p:nvSpPr>
+          <p:cNvPr id="3" name="Rectángulo 2">
+            <a:extLst>
+              <a:ext uri="{FF2B5EF4-FFF2-40B4-BE49-F238E27FC236}">
+                <a16:creationId xmlns:a16="http://schemas.microsoft.com/office/drawing/2014/main" id="{C47728CA-743B-1492-A50B-B5F3DAA2599D}"/>
+              </a:ext>
+            </a:extLst>
+          </p:cNvPr>
+          <p:cNvSpPr/>
+          <p:nvPr/>
+        </p:nvSpPr>
+        <p:spPr>
+          <a:xfrm>
+            <a:off x="3198481" y="1584358"/>
+            <a:ext cx="6057605" cy="4038404"/>
+          </a:xfrm>
+          <a:prstGeom prst="rect">
+            <a:avLst/>
+          </a:prstGeom>
+          <a:solidFill>
+            <a:schemeClr val="dk1">
+              <a:alpha val="64000"/>
+            </a:schemeClr>
+          </a:solidFill>
+          <a:ln>
+            <a:noFill/>
+          </a:ln>
+        </p:spPr>
+        <p:style>
+          <a:lnRef idx="2">
+            <a:schemeClr val="dk1">
+              <a:shade val="15000"/>
+            </a:schemeClr>
+          </a:lnRef>
+          <a:fillRef idx="1">
+            <a:schemeClr val="dk1"/>
+          </a:fillRef>
+          <a:effectRef idx="0">
+            <a:schemeClr val="dk1"/>
+          </a:effectRef>
+          <a:fontRef idx="minor">
+            <a:schemeClr val="lt1"/>
+          </a:fontRef>
+        </p:style>
+        <p:txBody>
+          <a:bodyPr rtlCol="0" anchor="ctr"/>
+          <a:lstStyle/>
+          <a:p>
+            <a:pPr algn="ctr"/>
+            <a:endParaRPr lang="es-ES"/>
+          </a:p>
+        </p:txBody>
+      </p:sp>
     </p:spTree>
     <p:extLst>
       <p:ext uri="{BB962C8B-B14F-4D97-AF65-F5344CB8AC3E}">
@@ -4898,6 +5779,147 @@
     <p:extLst>
       <p:ext uri="{BB962C8B-B14F-4D97-AF65-F5344CB8AC3E}">
         <p14:creationId xmlns:p14="http://schemas.microsoft.com/office/powerpoint/2010/main" val="3449742779"/>
+      </p:ext>
+    </p:extLst>
+  </p:cSld>
+  <p:clrMapOvr>
+    <a:masterClrMapping/>
+  </p:clrMapOvr>
+</p:sld>
+</file>
+
+<file path=ppt/slides/slide9.xml><?xml version="1.0" encoding="utf-8"?>
+<p:sld xmlns:a="http://schemas.openxmlformats.org/drawingml/2006/main" xmlns:r="http://schemas.openxmlformats.org/officeDocument/2006/relationships" xmlns:p="http://schemas.openxmlformats.org/presentationml/2006/main">
+  <p:cSld>
+    <p:spTree>
+      <p:nvGrpSpPr>
+        <p:cNvPr id="1" name=""/>
+        <p:cNvGrpSpPr/>
+        <p:nvPr/>
+      </p:nvGrpSpPr>
+      <p:grpSpPr>
+        <a:xfrm>
+          <a:off x="0" y="0"/>
+          <a:ext cx="0" cy="0"/>
+          <a:chOff x="0" y="0"/>
+          <a:chExt cx="0" cy="0"/>
+        </a:xfrm>
+      </p:grpSpPr>
+      <p:grpSp>
+        <p:nvGrpSpPr>
+          <p:cNvPr id="4" name="Grupo 3">
+            <a:extLst>
+              <a:ext uri="{FF2B5EF4-FFF2-40B4-BE49-F238E27FC236}">
+                <a16:creationId xmlns:a16="http://schemas.microsoft.com/office/drawing/2014/main" id="{E18096A1-AA6B-7CEA-C9FC-80C96A40F426}"/>
+              </a:ext>
+            </a:extLst>
+          </p:cNvPr>
+          <p:cNvGrpSpPr/>
+          <p:nvPr/>
+        </p:nvGrpSpPr>
+        <p:grpSpPr>
+          <a:xfrm>
+            <a:off x="564429" y="983430"/>
+            <a:ext cx="8758680" cy="5576219"/>
+            <a:chOff x="564429" y="983430"/>
+            <a:chExt cx="8758680" cy="5576219"/>
+          </a:xfrm>
+        </p:grpSpPr>
+        <p:pic>
+          <p:nvPicPr>
+            <p:cNvPr id="5" name="Imagen 4">
+              <a:extLst>
+                <a:ext uri="{FF2B5EF4-FFF2-40B4-BE49-F238E27FC236}">
+                  <a16:creationId xmlns:a16="http://schemas.microsoft.com/office/drawing/2014/main" id="{10D90007-1AD4-75D0-3719-5732F18CA8BD}"/>
+                </a:ext>
+              </a:extLst>
+            </p:cNvPr>
+            <p:cNvPicPr>
+              <a:picLocks noChangeAspect="1"/>
+            </p:cNvPicPr>
+            <p:nvPr/>
+          </p:nvPicPr>
+          <p:blipFill>
+            <a:blip r:embed="rId2">
+              <a:extLst>
+                <a:ext uri="{28A0092B-C50C-407E-A947-70E740481C1C}">
+                  <a14:useLocalDpi xmlns:a14="http://schemas.microsoft.com/office/drawing/2010/main" val="0"/>
+                </a:ext>
+              </a:extLst>
+            </a:blip>
+            <a:stretch>
+              <a:fillRect/>
+            </a:stretch>
+          </p:blipFill>
+          <p:spPr>
+            <a:xfrm>
+              <a:off x="564429" y="983431"/>
+              <a:ext cx="8758680" cy="5576218"/>
+            </a:xfrm>
+            <a:prstGeom prst="rect">
+              <a:avLst/>
+            </a:prstGeom>
+          </p:spPr>
+        </p:pic>
+        <p:sp>
+          <p:nvSpPr>
+            <p:cNvPr id="6" name="Rectángulo 5">
+              <a:extLst>
+                <a:ext uri="{FF2B5EF4-FFF2-40B4-BE49-F238E27FC236}">
+                  <a16:creationId xmlns:a16="http://schemas.microsoft.com/office/drawing/2014/main" id="{1DD12549-9998-EB64-E41E-1A678FBAA811}"/>
+                </a:ext>
+              </a:extLst>
+            </p:cNvPr>
+            <p:cNvSpPr/>
+            <p:nvPr/>
+          </p:nvSpPr>
+          <p:spPr>
+            <a:xfrm>
+              <a:off x="564429" y="983430"/>
+              <a:ext cx="8758680" cy="5576217"/>
+            </a:xfrm>
+            <a:prstGeom prst="rect">
+              <a:avLst/>
+            </a:prstGeom>
+            <a:solidFill>
+              <a:schemeClr val="dk1">
+                <a:alpha val="58000"/>
+              </a:schemeClr>
+            </a:solidFill>
+            <a:ln>
+              <a:noFill/>
+            </a:ln>
+          </p:spPr>
+          <p:style>
+            <a:lnRef idx="2">
+              <a:schemeClr val="dk1">
+                <a:shade val="15000"/>
+              </a:schemeClr>
+            </a:lnRef>
+            <a:fillRef idx="1">
+              <a:schemeClr val="dk1"/>
+            </a:fillRef>
+            <a:effectRef idx="0">
+              <a:schemeClr val="dk1"/>
+            </a:effectRef>
+            <a:fontRef idx="minor">
+              <a:schemeClr val="lt1"/>
+            </a:fontRef>
+          </p:style>
+          <p:txBody>
+            <a:bodyPr rtlCol="0" anchor="ctr"/>
+            <a:lstStyle/>
+            <a:p>
+              <a:pPr algn="ctr"/>
+              <a:endParaRPr lang="es-ES"/>
+            </a:p>
+          </p:txBody>
+        </p:sp>
+      </p:grpSp>
+    </p:spTree>
+    <p:extLst>
+      <p:ext uri="{BB962C8B-B14F-4D97-AF65-F5344CB8AC3E}">
+        <p14:creationId xmlns:p14="http://schemas.microsoft.com/office/powerpoint/2010/main" val="1692305363"/>
       </p:ext>
     </p:extLst>
   </p:cSld>

</xml_diff>

<commit_message>
Formuilarios - Botones de Agregar - Guardar y Salir
</commit_message>
<xml_diff>
--- a/static/img/UESJ.pptx
+++ b/static/img/UESJ.pptx
@@ -12,22 +12,23 @@
     <p:sldId id="260" r:id="rId6"/>
     <p:sldId id="261" r:id="rId7"/>
     <p:sldId id="262" r:id="rId8"/>
-    <p:sldId id="263" r:id="rId9"/>
-    <p:sldId id="264" r:id="rId10"/>
-    <p:sldId id="265" r:id="rId11"/>
-    <p:sldId id="270" r:id="rId12"/>
-    <p:sldId id="269" r:id="rId13"/>
-    <p:sldId id="268" r:id="rId14"/>
-    <p:sldId id="267" r:id="rId15"/>
-    <p:sldId id="266" r:id="rId16"/>
-    <p:sldId id="275" r:id="rId17"/>
-    <p:sldId id="274" r:id="rId18"/>
-    <p:sldId id="273" r:id="rId19"/>
-    <p:sldId id="278" r:id="rId20"/>
-    <p:sldId id="276" r:id="rId21"/>
-    <p:sldId id="277" r:id="rId22"/>
-    <p:sldId id="272" r:id="rId23"/>
-    <p:sldId id="271" r:id="rId24"/>
+    <p:sldId id="279" r:id="rId9"/>
+    <p:sldId id="263" r:id="rId10"/>
+    <p:sldId id="264" r:id="rId11"/>
+    <p:sldId id="265" r:id="rId12"/>
+    <p:sldId id="270" r:id="rId13"/>
+    <p:sldId id="269" r:id="rId14"/>
+    <p:sldId id="268" r:id="rId15"/>
+    <p:sldId id="267" r:id="rId16"/>
+    <p:sldId id="266" r:id="rId17"/>
+    <p:sldId id="275" r:id="rId18"/>
+    <p:sldId id="274" r:id="rId19"/>
+    <p:sldId id="273" r:id="rId20"/>
+    <p:sldId id="278" r:id="rId21"/>
+    <p:sldId id="276" r:id="rId22"/>
+    <p:sldId id="277" r:id="rId23"/>
+    <p:sldId id="272" r:id="rId24"/>
+    <p:sldId id="271" r:id="rId25"/>
   </p:sldIdLst>
   <p:sldSz cx="12192000" cy="6858000"/>
   <p:notesSz cx="6858000" cy="9144000"/>
@@ -281,7 +282,7 @@
           <a:p>
             <a:fld id="{61C0A7A1-1656-4159-BA00-B5D52E614300}" type="datetimeFigureOut">
               <a:rPr lang="es-ES" smtClean="0"/>
-              <a:t>16/06/2024</a:t>
+              <a:t>25/06/2024</a:t>
             </a:fld>
             <a:endParaRPr lang="es-ES"/>
           </a:p>
@@ -479,7 +480,7 @@
           <a:p>
             <a:fld id="{61C0A7A1-1656-4159-BA00-B5D52E614300}" type="datetimeFigureOut">
               <a:rPr lang="es-ES" smtClean="0"/>
-              <a:t>16/06/2024</a:t>
+              <a:t>25/06/2024</a:t>
             </a:fld>
             <a:endParaRPr lang="es-ES"/>
           </a:p>
@@ -687,7 +688,7 @@
           <a:p>
             <a:fld id="{61C0A7A1-1656-4159-BA00-B5D52E614300}" type="datetimeFigureOut">
               <a:rPr lang="es-ES" smtClean="0"/>
-              <a:t>16/06/2024</a:t>
+              <a:t>25/06/2024</a:t>
             </a:fld>
             <a:endParaRPr lang="es-ES"/>
           </a:p>
@@ -885,7 +886,7 @@
           <a:p>
             <a:fld id="{61C0A7A1-1656-4159-BA00-B5D52E614300}" type="datetimeFigureOut">
               <a:rPr lang="es-ES" smtClean="0"/>
-              <a:t>16/06/2024</a:t>
+              <a:t>25/06/2024</a:t>
             </a:fld>
             <a:endParaRPr lang="es-ES"/>
           </a:p>
@@ -1160,7 +1161,7 @@
           <a:p>
             <a:fld id="{61C0A7A1-1656-4159-BA00-B5D52E614300}" type="datetimeFigureOut">
               <a:rPr lang="es-ES" smtClean="0"/>
-              <a:t>16/06/2024</a:t>
+              <a:t>25/06/2024</a:t>
             </a:fld>
             <a:endParaRPr lang="es-ES"/>
           </a:p>
@@ -1425,7 +1426,7 @@
           <a:p>
             <a:fld id="{61C0A7A1-1656-4159-BA00-B5D52E614300}" type="datetimeFigureOut">
               <a:rPr lang="es-ES" smtClean="0"/>
-              <a:t>16/06/2024</a:t>
+              <a:t>25/06/2024</a:t>
             </a:fld>
             <a:endParaRPr lang="es-ES"/>
           </a:p>
@@ -1837,7 +1838,7 @@
           <a:p>
             <a:fld id="{61C0A7A1-1656-4159-BA00-B5D52E614300}" type="datetimeFigureOut">
               <a:rPr lang="es-ES" smtClean="0"/>
-              <a:t>16/06/2024</a:t>
+              <a:t>25/06/2024</a:t>
             </a:fld>
             <a:endParaRPr lang="es-ES"/>
           </a:p>
@@ -1978,7 +1979,7 @@
           <a:p>
             <a:fld id="{61C0A7A1-1656-4159-BA00-B5D52E614300}" type="datetimeFigureOut">
               <a:rPr lang="es-ES" smtClean="0"/>
-              <a:t>16/06/2024</a:t>
+              <a:t>25/06/2024</a:t>
             </a:fld>
             <a:endParaRPr lang="es-ES"/>
           </a:p>
@@ -2091,7 +2092,7 @@
           <a:p>
             <a:fld id="{61C0A7A1-1656-4159-BA00-B5D52E614300}" type="datetimeFigureOut">
               <a:rPr lang="es-ES" smtClean="0"/>
-              <a:t>16/06/2024</a:t>
+              <a:t>25/06/2024</a:t>
             </a:fld>
             <a:endParaRPr lang="es-ES"/>
           </a:p>
@@ -2402,7 +2403,7 @@
           <a:p>
             <a:fld id="{61C0A7A1-1656-4159-BA00-B5D52E614300}" type="datetimeFigureOut">
               <a:rPr lang="es-ES" smtClean="0"/>
-              <a:t>16/06/2024</a:t>
+              <a:t>25/06/2024</a:t>
             </a:fld>
             <a:endParaRPr lang="es-ES"/>
           </a:p>
@@ -2690,7 +2691,7 @@
           <a:p>
             <a:fld id="{61C0A7A1-1656-4159-BA00-B5D52E614300}" type="datetimeFigureOut">
               <a:rPr lang="es-ES" smtClean="0"/>
-              <a:t>16/06/2024</a:t>
+              <a:t>25/06/2024</a:t>
             </a:fld>
             <a:endParaRPr lang="es-ES"/>
           </a:p>
@@ -2931,7 +2932,7 @@
           <a:p>
             <a:fld id="{61C0A7A1-1656-4159-BA00-B5D52E614300}" type="datetimeFigureOut">
               <a:rPr lang="es-ES" smtClean="0"/>
-              <a:t>16/06/2024</a:t>
+              <a:t>25/06/2024</a:t>
             </a:fld>
             <a:endParaRPr lang="es-ES"/>
           </a:p>
@@ -3935,46 +3936,121 @@
           <a:chExt cx="0" cy="0"/>
         </a:xfrm>
       </p:grpSpPr>
-      <p:pic>
-        <p:nvPicPr>
-          <p:cNvPr id="5" name="Imagen 4">
-            <a:extLst>
-              <a:ext uri="{FF2B5EF4-FFF2-40B4-BE49-F238E27FC236}">
-                <a16:creationId xmlns:a16="http://schemas.microsoft.com/office/drawing/2014/main" id="{1DFD1DB2-B111-EB4B-AAF3-7F07FB4DF428}"/>
-              </a:ext>
-            </a:extLst>
-          </p:cNvPr>
-          <p:cNvPicPr>
-            <a:picLocks noChangeAspect="1"/>
-          </p:cNvPicPr>
+      <p:grpSp>
+        <p:nvGrpSpPr>
+          <p:cNvPr id="4" name="Grupo 3">
+            <a:extLst>
+              <a:ext uri="{FF2B5EF4-FFF2-40B4-BE49-F238E27FC236}">
+                <a16:creationId xmlns:a16="http://schemas.microsoft.com/office/drawing/2014/main" id="{E18096A1-AA6B-7CEA-C9FC-80C96A40F426}"/>
+              </a:ext>
+            </a:extLst>
+          </p:cNvPr>
+          <p:cNvGrpSpPr/>
           <p:nvPr/>
-        </p:nvPicPr>
-        <p:blipFill>
-          <a:blip r:embed="rId2">
-            <a:extLst>
-              <a:ext uri="{28A0092B-C50C-407E-A947-70E740481C1C}">
-                <a14:useLocalDpi xmlns:a14="http://schemas.microsoft.com/office/drawing/2010/main" val="0"/>
-              </a:ext>
-            </a:extLst>
-          </a:blip>
-          <a:stretch>
-            <a:fillRect/>
-          </a:stretch>
-        </p:blipFill>
-        <p:spPr>
+        </p:nvGrpSpPr>
+        <p:grpSpPr>
           <a:xfrm>
-            <a:off x="2876550" y="1282700"/>
-            <a:ext cx="6438900" cy="4292600"/>
+            <a:off x="564429" y="983430"/>
+            <a:ext cx="8758680" cy="5576219"/>
+            <a:chOff x="564429" y="983430"/>
+            <a:chExt cx="8758680" cy="5576219"/>
           </a:xfrm>
-          <a:prstGeom prst="rect">
-            <a:avLst/>
-          </a:prstGeom>
-        </p:spPr>
-      </p:pic>
+        </p:grpSpPr>
+        <p:pic>
+          <p:nvPicPr>
+            <p:cNvPr id="5" name="Imagen 4">
+              <a:extLst>
+                <a:ext uri="{FF2B5EF4-FFF2-40B4-BE49-F238E27FC236}">
+                  <a16:creationId xmlns:a16="http://schemas.microsoft.com/office/drawing/2014/main" id="{10D90007-1AD4-75D0-3719-5732F18CA8BD}"/>
+                </a:ext>
+              </a:extLst>
+            </p:cNvPr>
+            <p:cNvPicPr>
+              <a:picLocks noChangeAspect="1"/>
+            </p:cNvPicPr>
+            <p:nvPr/>
+          </p:nvPicPr>
+          <p:blipFill>
+            <a:blip r:embed="rId2">
+              <a:extLst>
+                <a:ext uri="{28A0092B-C50C-407E-A947-70E740481C1C}">
+                  <a14:useLocalDpi xmlns:a14="http://schemas.microsoft.com/office/drawing/2010/main" val="0"/>
+                </a:ext>
+              </a:extLst>
+            </a:blip>
+            <a:stretch>
+              <a:fillRect/>
+            </a:stretch>
+          </p:blipFill>
+          <p:spPr>
+            <a:xfrm>
+              <a:off x="564429" y="983431"/>
+              <a:ext cx="8758680" cy="5576218"/>
+            </a:xfrm>
+            <a:prstGeom prst="rect">
+              <a:avLst/>
+            </a:prstGeom>
+          </p:spPr>
+        </p:pic>
+        <p:sp>
+          <p:nvSpPr>
+            <p:cNvPr id="6" name="Rectángulo 5">
+              <a:extLst>
+                <a:ext uri="{FF2B5EF4-FFF2-40B4-BE49-F238E27FC236}">
+                  <a16:creationId xmlns:a16="http://schemas.microsoft.com/office/drawing/2014/main" id="{1DD12549-9998-EB64-E41E-1A678FBAA811}"/>
+                </a:ext>
+              </a:extLst>
+            </p:cNvPr>
+            <p:cNvSpPr/>
+            <p:nvPr/>
+          </p:nvSpPr>
+          <p:spPr>
+            <a:xfrm>
+              <a:off x="564429" y="983430"/>
+              <a:ext cx="8758680" cy="5576217"/>
+            </a:xfrm>
+            <a:prstGeom prst="rect">
+              <a:avLst/>
+            </a:prstGeom>
+            <a:solidFill>
+              <a:schemeClr val="dk1">
+                <a:alpha val="58000"/>
+              </a:schemeClr>
+            </a:solidFill>
+            <a:ln>
+              <a:noFill/>
+            </a:ln>
+          </p:spPr>
+          <p:style>
+            <a:lnRef idx="2">
+              <a:schemeClr val="dk1">
+                <a:shade val="15000"/>
+              </a:schemeClr>
+            </a:lnRef>
+            <a:fillRef idx="1">
+              <a:schemeClr val="dk1"/>
+            </a:fillRef>
+            <a:effectRef idx="0">
+              <a:schemeClr val="dk1"/>
+            </a:effectRef>
+            <a:fontRef idx="minor">
+              <a:schemeClr val="lt1"/>
+            </a:fontRef>
+          </p:style>
+          <p:txBody>
+            <a:bodyPr rtlCol="0" anchor="ctr"/>
+            <a:lstStyle/>
+            <a:p>
+              <a:pPr algn="ctr"/>
+              <a:endParaRPr lang="es-ES"/>
+            </a:p>
+          </p:txBody>
+        </p:sp>
+      </p:grpSp>
     </p:spTree>
     <p:extLst>
       <p:ext uri="{BB962C8B-B14F-4D97-AF65-F5344CB8AC3E}">
-        <p14:creationId xmlns:p14="http://schemas.microsoft.com/office/powerpoint/2010/main" val="2458047420"/>
+        <p14:creationId xmlns:p14="http://schemas.microsoft.com/office/powerpoint/2010/main" val="1692305363"/>
       </p:ext>
     </p:extLst>
   </p:cSld>
@@ -4003,10 +4079,10 @@
       </p:grpSpPr>
       <p:pic>
         <p:nvPicPr>
-          <p:cNvPr id="3" name="Imagen 2">
-            <a:extLst>
-              <a:ext uri="{FF2B5EF4-FFF2-40B4-BE49-F238E27FC236}">
-                <a16:creationId xmlns:a16="http://schemas.microsoft.com/office/drawing/2014/main" id="{B83DB8E3-11B8-20EF-4D74-196C9309E8B1}"/>
+          <p:cNvPr id="5" name="Imagen 4">
+            <a:extLst>
+              <a:ext uri="{FF2B5EF4-FFF2-40B4-BE49-F238E27FC236}">
+                <a16:creationId xmlns:a16="http://schemas.microsoft.com/office/drawing/2014/main" id="{1DFD1DB2-B111-EB4B-AAF3-7F07FB4DF428}"/>
               </a:ext>
             </a:extLst>
           </p:cNvPr>
@@ -4029,8 +4105,8 @@
         </p:blipFill>
         <p:spPr>
           <a:xfrm>
-            <a:off x="2584450" y="1454150"/>
-            <a:ext cx="7023100" cy="3949700"/>
+            <a:off x="0" y="0"/>
+            <a:ext cx="12192000" cy="6843860"/>
           </a:xfrm>
           <a:prstGeom prst="rect">
             <a:avLst/>
@@ -4040,7 +4116,7 @@
     </p:spTree>
     <p:extLst>
       <p:ext uri="{BB962C8B-B14F-4D97-AF65-F5344CB8AC3E}">
-        <p14:creationId xmlns:p14="http://schemas.microsoft.com/office/powerpoint/2010/main" val="558989574"/>
+        <p14:creationId xmlns:p14="http://schemas.microsoft.com/office/powerpoint/2010/main" val="2458047420"/>
       </p:ext>
     </p:extLst>
   </p:cSld>
@@ -4072,7 +4148,7 @@
           <p:cNvPr id="3" name="Imagen 2">
             <a:extLst>
               <a:ext uri="{FF2B5EF4-FFF2-40B4-BE49-F238E27FC236}">
-                <a16:creationId xmlns:a16="http://schemas.microsoft.com/office/drawing/2014/main" id="{3917A570-BC72-0F3B-F71A-9DB96A608655}"/>
+                <a16:creationId xmlns:a16="http://schemas.microsoft.com/office/drawing/2014/main" id="{B83DB8E3-11B8-20EF-4D74-196C9309E8B1}"/>
               </a:ext>
             </a:extLst>
           </p:cNvPr>
@@ -4095,8 +4171,8 @@
         </p:blipFill>
         <p:spPr>
           <a:xfrm>
-            <a:off x="2863850" y="1276350"/>
-            <a:ext cx="6464300" cy="4305300"/>
+            <a:off x="2584450" y="1454150"/>
+            <a:ext cx="7023100" cy="3949700"/>
           </a:xfrm>
           <a:prstGeom prst="rect">
             <a:avLst/>
@@ -4106,7 +4182,7 @@
     </p:spTree>
     <p:extLst>
       <p:ext uri="{BB962C8B-B14F-4D97-AF65-F5344CB8AC3E}">
-        <p14:creationId xmlns:p14="http://schemas.microsoft.com/office/powerpoint/2010/main" val="1446607113"/>
+        <p14:creationId xmlns:p14="http://schemas.microsoft.com/office/powerpoint/2010/main" val="558989574"/>
       </p:ext>
     </p:extLst>
   </p:cSld>
@@ -4138,7 +4214,7 @@
           <p:cNvPr id="3" name="Imagen 2">
             <a:extLst>
               <a:ext uri="{FF2B5EF4-FFF2-40B4-BE49-F238E27FC236}">
-                <a16:creationId xmlns:a16="http://schemas.microsoft.com/office/drawing/2014/main" id="{C741B510-BF43-8A59-6E08-CF05676BA24E}"/>
+                <a16:creationId xmlns:a16="http://schemas.microsoft.com/office/drawing/2014/main" id="{3917A570-BC72-0F3B-F71A-9DB96A608655}"/>
               </a:ext>
             </a:extLst>
           </p:cNvPr>
@@ -4172,7 +4248,7 @@
     </p:spTree>
     <p:extLst>
       <p:ext uri="{BB962C8B-B14F-4D97-AF65-F5344CB8AC3E}">
-        <p14:creationId xmlns:p14="http://schemas.microsoft.com/office/powerpoint/2010/main" val="247343404"/>
+        <p14:creationId xmlns:p14="http://schemas.microsoft.com/office/powerpoint/2010/main" val="1446607113"/>
       </p:ext>
     </p:extLst>
   </p:cSld>
@@ -4204,7 +4280,7 @@
           <p:cNvPr id="3" name="Imagen 2">
             <a:extLst>
               <a:ext uri="{FF2B5EF4-FFF2-40B4-BE49-F238E27FC236}">
-                <a16:creationId xmlns:a16="http://schemas.microsoft.com/office/drawing/2014/main" id="{4E66B551-3872-B558-9BD0-960CECD69946}"/>
+                <a16:creationId xmlns:a16="http://schemas.microsoft.com/office/drawing/2014/main" id="{C741B510-BF43-8A59-6E08-CF05676BA24E}"/>
               </a:ext>
             </a:extLst>
           </p:cNvPr>
@@ -4238,7 +4314,7 @@
     </p:spTree>
     <p:extLst>
       <p:ext uri="{BB962C8B-B14F-4D97-AF65-F5344CB8AC3E}">
-        <p14:creationId xmlns:p14="http://schemas.microsoft.com/office/powerpoint/2010/main" val="2957448135"/>
+        <p14:creationId xmlns:p14="http://schemas.microsoft.com/office/powerpoint/2010/main" val="247343404"/>
       </p:ext>
     </p:extLst>
   </p:cSld>
@@ -4270,7 +4346,7 @@
           <p:cNvPr id="3" name="Imagen 2">
             <a:extLst>
               <a:ext uri="{FF2B5EF4-FFF2-40B4-BE49-F238E27FC236}">
-                <a16:creationId xmlns:a16="http://schemas.microsoft.com/office/drawing/2014/main" id="{4408D9DD-A5EE-B4F3-92E4-EC81E2BA3B07}"/>
+                <a16:creationId xmlns:a16="http://schemas.microsoft.com/office/drawing/2014/main" id="{4E66B551-3872-B558-9BD0-960CECD69946}"/>
               </a:ext>
             </a:extLst>
           </p:cNvPr>
@@ -4304,7 +4380,7 @@
     </p:spTree>
     <p:extLst>
       <p:ext uri="{BB962C8B-B14F-4D97-AF65-F5344CB8AC3E}">
-        <p14:creationId xmlns:p14="http://schemas.microsoft.com/office/powerpoint/2010/main" val="2602743550"/>
+        <p14:creationId xmlns:p14="http://schemas.microsoft.com/office/powerpoint/2010/main" val="2957448135"/>
       </p:ext>
     </p:extLst>
   </p:cSld>
@@ -4336,7 +4412,7 @@
           <p:cNvPr id="3" name="Imagen 2">
             <a:extLst>
               <a:ext uri="{FF2B5EF4-FFF2-40B4-BE49-F238E27FC236}">
-                <a16:creationId xmlns:a16="http://schemas.microsoft.com/office/drawing/2014/main" id="{8B630D71-1392-143F-454C-FA2C94FD7A53}"/>
+                <a16:creationId xmlns:a16="http://schemas.microsoft.com/office/drawing/2014/main" id="{4408D9DD-A5EE-B4F3-92E4-EC81E2BA3B07}"/>
               </a:ext>
             </a:extLst>
           </p:cNvPr>
@@ -4359,8 +4435,8 @@
         </p:blipFill>
         <p:spPr>
           <a:xfrm>
-            <a:off x="2851150" y="1282700"/>
-            <a:ext cx="6489700" cy="4292600"/>
+            <a:off x="2863850" y="1276350"/>
+            <a:ext cx="6464300" cy="4305300"/>
           </a:xfrm>
           <a:prstGeom prst="rect">
             <a:avLst/>
@@ -4370,7 +4446,7 @@
     </p:spTree>
     <p:extLst>
       <p:ext uri="{BB962C8B-B14F-4D97-AF65-F5344CB8AC3E}">
-        <p14:creationId xmlns:p14="http://schemas.microsoft.com/office/powerpoint/2010/main" val="1203213174"/>
+        <p14:creationId xmlns:p14="http://schemas.microsoft.com/office/powerpoint/2010/main" val="2602743550"/>
       </p:ext>
     </p:extLst>
   </p:cSld>
@@ -4402,7 +4478,7 @@
           <p:cNvPr id="3" name="Imagen 2">
             <a:extLst>
               <a:ext uri="{FF2B5EF4-FFF2-40B4-BE49-F238E27FC236}">
-                <a16:creationId xmlns:a16="http://schemas.microsoft.com/office/drawing/2014/main" id="{2E42D5C6-FDAB-09C4-CBCC-F6275BD840A7}"/>
+                <a16:creationId xmlns:a16="http://schemas.microsoft.com/office/drawing/2014/main" id="{8B630D71-1392-143F-454C-FA2C94FD7A53}"/>
               </a:ext>
             </a:extLst>
           </p:cNvPr>
@@ -4425,8 +4501,8 @@
         </p:blipFill>
         <p:spPr>
           <a:xfrm>
-            <a:off x="2762250" y="1333500"/>
-            <a:ext cx="6667500" cy="4191000"/>
+            <a:off x="2851150" y="1282700"/>
+            <a:ext cx="6489700" cy="4292600"/>
           </a:xfrm>
           <a:prstGeom prst="rect">
             <a:avLst/>
@@ -4436,7 +4512,7 @@
     </p:spTree>
     <p:extLst>
       <p:ext uri="{BB962C8B-B14F-4D97-AF65-F5344CB8AC3E}">
-        <p14:creationId xmlns:p14="http://schemas.microsoft.com/office/powerpoint/2010/main" val="4211548573"/>
+        <p14:creationId xmlns:p14="http://schemas.microsoft.com/office/powerpoint/2010/main" val="1203213174"/>
       </p:ext>
     </p:extLst>
   </p:cSld>
@@ -4468,7 +4544,7 @@
           <p:cNvPr id="3" name="Imagen 2">
             <a:extLst>
               <a:ext uri="{FF2B5EF4-FFF2-40B4-BE49-F238E27FC236}">
-                <a16:creationId xmlns:a16="http://schemas.microsoft.com/office/drawing/2014/main" id="{F0D87928-46B0-230B-5DB9-00B1EB726877}"/>
+                <a16:creationId xmlns:a16="http://schemas.microsoft.com/office/drawing/2014/main" id="{2E42D5C6-FDAB-09C4-CBCC-F6275BD840A7}"/>
               </a:ext>
             </a:extLst>
           </p:cNvPr>
@@ -4491,8 +4567,8 @@
         </p:blipFill>
         <p:spPr>
           <a:xfrm>
-            <a:off x="3022600" y="1155700"/>
-            <a:ext cx="6146800" cy="4546600"/>
+            <a:off x="2762250" y="1333500"/>
+            <a:ext cx="6667500" cy="4191000"/>
           </a:xfrm>
           <a:prstGeom prst="rect">
             <a:avLst/>
@@ -4502,7 +4578,7 @@
     </p:spTree>
     <p:extLst>
       <p:ext uri="{BB962C8B-B14F-4D97-AF65-F5344CB8AC3E}">
-        <p14:creationId xmlns:p14="http://schemas.microsoft.com/office/powerpoint/2010/main" val="3649093703"/>
+        <p14:creationId xmlns:p14="http://schemas.microsoft.com/office/powerpoint/2010/main" val="4211548573"/>
       </p:ext>
     </p:extLst>
   </p:cSld>
@@ -4534,12 +4610,12 @@
           <p:cNvPr id="3" name="Imagen 2">
             <a:extLst>
               <a:ext uri="{FF2B5EF4-FFF2-40B4-BE49-F238E27FC236}">
-                <a16:creationId xmlns:a16="http://schemas.microsoft.com/office/drawing/2014/main" id="{CCCDBAA0-4E20-39F3-45A3-33117505FD3D}"/>
+                <a16:creationId xmlns:a16="http://schemas.microsoft.com/office/drawing/2014/main" id="{F0D87928-46B0-230B-5DB9-00B1EB726877}"/>
               </a:ext>
             </a:extLst>
           </p:cNvPr>
           <p:cNvPicPr>
-            <a:picLocks/>
+            <a:picLocks noChangeAspect="1"/>
           </p:cNvPicPr>
           <p:nvPr/>
         </p:nvPicPr>
@@ -4557,8 +4633,8 @@
         </p:blipFill>
         <p:spPr>
           <a:xfrm>
-            <a:off x="186612" y="392062"/>
-            <a:ext cx="10782000" cy="5824800"/>
+            <a:off x="3022600" y="1155700"/>
+            <a:ext cx="6146800" cy="4546600"/>
           </a:xfrm>
           <a:prstGeom prst="rect">
             <a:avLst/>
@@ -4568,7 +4644,7 @@
     </p:spTree>
     <p:extLst>
       <p:ext uri="{BB962C8B-B14F-4D97-AF65-F5344CB8AC3E}">
-        <p14:creationId xmlns:p14="http://schemas.microsoft.com/office/powerpoint/2010/main" val="3222987124"/>
+        <p14:creationId xmlns:p14="http://schemas.microsoft.com/office/powerpoint/2010/main" val="3649093703"/>
       </p:ext>
     </p:extLst>
   </p:cSld>
@@ -4949,6 +5025,72 @@
       </p:grpSpPr>
       <p:pic>
         <p:nvPicPr>
+          <p:cNvPr id="3" name="Imagen 2">
+            <a:extLst>
+              <a:ext uri="{FF2B5EF4-FFF2-40B4-BE49-F238E27FC236}">
+                <a16:creationId xmlns:a16="http://schemas.microsoft.com/office/drawing/2014/main" id="{CCCDBAA0-4E20-39F3-45A3-33117505FD3D}"/>
+              </a:ext>
+            </a:extLst>
+          </p:cNvPr>
+          <p:cNvPicPr>
+            <a:picLocks/>
+          </p:cNvPicPr>
+          <p:nvPr/>
+        </p:nvPicPr>
+        <p:blipFill>
+          <a:blip r:embed="rId2">
+            <a:extLst>
+              <a:ext uri="{28A0092B-C50C-407E-A947-70E740481C1C}">
+                <a14:useLocalDpi xmlns:a14="http://schemas.microsoft.com/office/drawing/2010/main" val="0"/>
+              </a:ext>
+            </a:extLst>
+          </a:blip>
+          <a:stretch>
+            <a:fillRect/>
+          </a:stretch>
+        </p:blipFill>
+        <p:spPr>
+          <a:xfrm>
+            <a:off x="186612" y="392062"/>
+            <a:ext cx="10782000" cy="5824800"/>
+          </a:xfrm>
+          <a:prstGeom prst="rect">
+            <a:avLst/>
+          </a:prstGeom>
+        </p:spPr>
+      </p:pic>
+    </p:spTree>
+    <p:extLst>
+      <p:ext uri="{BB962C8B-B14F-4D97-AF65-F5344CB8AC3E}">
+        <p14:creationId xmlns:p14="http://schemas.microsoft.com/office/powerpoint/2010/main" val="3222987124"/>
+      </p:ext>
+    </p:extLst>
+  </p:cSld>
+  <p:clrMapOvr>
+    <a:masterClrMapping/>
+  </p:clrMapOvr>
+</p:sld>
+</file>
+
+<file path=ppt/slides/slide21.xml><?xml version="1.0" encoding="utf-8"?>
+<p:sld xmlns:a="http://schemas.openxmlformats.org/drawingml/2006/main" xmlns:r="http://schemas.openxmlformats.org/officeDocument/2006/relationships" xmlns:p="http://schemas.openxmlformats.org/presentationml/2006/main">
+  <p:cSld>
+    <p:spTree>
+      <p:nvGrpSpPr>
+        <p:cNvPr id="1" name=""/>
+        <p:cNvGrpSpPr/>
+        <p:nvPr/>
+      </p:nvGrpSpPr>
+      <p:grpSpPr>
+        <a:xfrm>
+          <a:off x="0" y="0"/>
+          <a:ext cx="0" cy="0"/>
+          <a:chOff x="0" y="0"/>
+          <a:chExt cx="0" cy="0"/>
+        </a:xfrm>
+      </p:grpSpPr>
+      <p:pic>
+        <p:nvPicPr>
           <p:cNvPr id="8" name="Imagen 7">
             <a:extLst>
               <a:ext uri="{FF2B5EF4-FFF2-40B4-BE49-F238E27FC236}">
@@ -4996,7 +5138,7 @@
 </p:sld>
 </file>
 
-<file path=ppt/slides/slide21.xml><?xml version="1.0" encoding="utf-8"?>
+<file path=ppt/slides/slide22.xml><?xml version="1.0" encoding="utf-8"?>
 <p:sld xmlns:a="http://schemas.openxmlformats.org/drawingml/2006/main" xmlns:r="http://schemas.openxmlformats.org/officeDocument/2006/relationships" xmlns:p="http://schemas.openxmlformats.org/presentationml/2006/main">
   <p:cSld>
     <p:spTree>
@@ -5061,7 +5203,7 @@
 </p:sld>
 </file>
 
-<file path=ppt/slides/slide22.xml><?xml version="1.0" encoding="utf-8"?>
+<file path=ppt/slides/slide23.xml><?xml version="1.0" encoding="utf-8"?>
 <p:sld xmlns:a="http://schemas.openxmlformats.org/drawingml/2006/main" xmlns:r="http://schemas.openxmlformats.org/officeDocument/2006/relationships" xmlns:p="http://schemas.openxmlformats.org/presentationml/2006/main">
   <p:cSld>
     <p:spTree>
@@ -5127,7 +5269,7 @@
 </p:sld>
 </file>
 
-<file path=ppt/slides/slide23.xml><?xml version="1.0" encoding="utf-8"?>
+<file path=ppt/slides/slide24.xml><?xml version="1.0" encoding="utf-8"?>
 <p:sld xmlns:a="http://schemas.openxmlformats.org/drawingml/2006/main" xmlns:r="http://schemas.openxmlformats.org/officeDocument/2006/relationships" xmlns:p="http://schemas.openxmlformats.org/presentationml/2006/main">
   <p:cSld>
     <p:spTree>
@@ -5629,44 +5771,8 @@
         </p:blipFill>
         <p:spPr>
           <a:xfrm>
-            <a:off x="546755" y="245097"/>
-            <a:ext cx="5731497" cy="2771480"/>
-          </a:xfrm>
-          <a:prstGeom prst="rect">
-            <a:avLst/>
-          </a:prstGeom>
-        </p:spPr>
-      </p:pic>
-      <p:pic>
-        <p:nvPicPr>
-          <p:cNvPr id="8" name="Imagen 7">
-            <a:extLst>
-              <a:ext uri="{FF2B5EF4-FFF2-40B4-BE49-F238E27FC236}">
-                <a16:creationId xmlns:a16="http://schemas.microsoft.com/office/drawing/2014/main" id="{B7EE39CA-25F9-EA5A-5324-D9D7E6223D18}"/>
-              </a:ext>
-            </a:extLst>
-          </p:cNvPr>
-          <p:cNvPicPr>
-            <a:picLocks noChangeAspect="1"/>
-          </p:cNvPicPr>
-          <p:nvPr/>
-        </p:nvPicPr>
-        <p:blipFill>
-          <a:blip r:embed="rId3">
-            <a:extLst>
-              <a:ext uri="{28A0092B-C50C-407E-A947-70E740481C1C}">
-                <a14:useLocalDpi xmlns:a14="http://schemas.microsoft.com/office/drawing/2010/main" val="0"/>
-              </a:ext>
-            </a:extLst>
-          </a:blip>
-          <a:stretch>
-            <a:fillRect/>
-          </a:stretch>
-        </p:blipFill>
-        <p:spPr>
-          <a:xfrm>
-            <a:off x="6460503" y="4086520"/>
-            <a:ext cx="5731497" cy="2771480"/>
+            <a:off x="150830" y="94267"/>
+            <a:ext cx="9513508" cy="4600281"/>
           </a:xfrm>
           <a:prstGeom prst="rect">
             <a:avLst/>
@@ -5705,10 +5811,10 @@
       </p:grpSpPr>
       <p:pic>
         <p:nvPicPr>
-          <p:cNvPr id="3" name="Imagen 2">
-            <a:extLst>
-              <a:ext uri="{FF2B5EF4-FFF2-40B4-BE49-F238E27FC236}">
-                <a16:creationId xmlns:a16="http://schemas.microsoft.com/office/drawing/2014/main" id="{CCCDBAA0-4E20-39F3-45A3-33117505FD3D}"/>
+          <p:cNvPr id="8" name="Imagen 7">
+            <a:extLst>
+              <a:ext uri="{FF2B5EF4-FFF2-40B4-BE49-F238E27FC236}">
+                <a16:creationId xmlns:a16="http://schemas.microsoft.com/office/drawing/2014/main" id="{B7EE39CA-25F9-EA5A-5324-D9D7E6223D18}"/>
               </a:ext>
             </a:extLst>
           </p:cNvPr>
@@ -5731,44 +5837,8 @@
         </p:blipFill>
         <p:spPr>
           <a:xfrm>
-            <a:off x="0" y="0"/>
-            <a:ext cx="5731497" cy="2771480"/>
-          </a:xfrm>
-          <a:prstGeom prst="rect">
-            <a:avLst/>
-          </a:prstGeom>
-        </p:spPr>
-      </p:pic>
-      <p:pic>
-        <p:nvPicPr>
-          <p:cNvPr id="2" name="Imagen 1">
-            <a:extLst>
-              <a:ext uri="{FF2B5EF4-FFF2-40B4-BE49-F238E27FC236}">
-                <a16:creationId xmlns:a16="http://schemas.microsoft.com/office/drawing/2014/main" id="{9806CF1F-17E3-B3BC-6E7A-60928C66AC8B}"/>
-              </a:ext>
-            </a:extLst>
-          </p:cNvPr>
-          <p:cNvPicPr>
-            <a:picLocks noChangeAspect="1"/>
-          </p:cNvPicPr>
-          <p:nvPr/>
-        </p:nvPicPr>
-        <p:blipFill>
-          <a:blip r:embed="rId3">
-            <a:extLst>
-              <a:ext uri="{28A0092B-C50C-407E-A947-70E740481C1C}">
-                <a14:useLocalDpi xmlns:a14="http://schemas.microsoft.com/office/drawing/2010/main" val="0"/>
-              </a:ext>
-            </a:extLst>
-          </a:blip>
-          <a:stretch>
-            <a:fillRect/>
-          </a:stretch>
-        </p:blipFill>
-        <p:spPr>
-          <a:xfrm>
-            <a:off x="6096000" y="0"/>
-            <a:ext cx="5731497" cy="2771480"/>
+            <a:off x="2599108" y="2228851"/>
+            <a:ext cx="9519597" cy="4603226"/>
           </a:xfrm>
           <a:prstGeom prst="rect">
             <a:avLst/>
@@ -5778,7 +5848,7 @@
     </p:spTree>
     <p:extLst>
       <p:ext uri="{BB962C8B-B14F-4D97-AF65-F5344CB8AC3E}">
-        <p14:creationId xmlns:p14="http://schemas.microsoft.com/office/powerpoint/2010/main" val="3449742779"/>
+        <p14:creationId xmlns:p14="http://schemas.microsoft.com/office/powerpoint/2010/main" val="2212686794"/>
       </p:ext>
     </p:extLst>
   </p:cSld>
@@ -5805,121 +5875,46 @@
           <a:chExt cx="0" cy="0"/>
         </a:xfrm>
       </p:grpSpPr>
-      <p:grpSp>
-        <p:nvGrpSpPr>
-          <p:cNvPr id="4" name="Grupo 3">
-            <a:extLst>
-              <a:ext uri="{FF2B5EF4-FFF2-40B4-BE49-F238E27FC236}">
-                <a16:creationId xmlns:a16="http://schemas.microsoft.com/office/drawing/2014/main" id="{E18096A1-AA6B-7CEA-C9FC-80C96A40F426}"/>
-              </a:ext>
-            </a:extLst>
-          </p:cNvPr>
-          <p:cNvGrpSpPr/>
+      <p:pic>
+        <p:nvPicPr>
+          <p:cNvPr id="3" name="Imagen 2">
+            <a:extLst>
+              <a:ext uri="{FF2B5EF4-FFF2-40B4-BE49-F238E27FC236}">
+                <a16:creationId xmlns:a16="http://schemas.microsoft.com/office/drawing/2014/main" id="{CCCDBAA0-4E20-39F3-45A3-33117505FD3D}"/>
+              </a:ext>
+            </a:extLst>
+          </p:cNvPr>
+          <p:cNvPicPr>
+            <a:picLocks noChangeAspect="1"/>
+          </p:cNvPicPr>
           <p:nvPr/>
-        </p:nvGrpSpPr>
-        <p:grpSpPr>
+        </p:nvPicPr>
+        <p:blipFill>
+          <a:blip r:embed="rId2">
+            <a:extLst>
+              <a:ext uri="{28A0092B-C50C-407E-A947-70E740481C1C}">
+                <a14:useLocalDpi xmlns:a14="http://schemas.microsoft.com/office/drawing/2010/main" val="0"/>
+              </a:ext>
+            </a:extLst>
+          </a:blip>
+          <a:stretch>
+            <a:fillRect/>
+          </a:stretch>
+        </p:blipFill>
+        <p:spPr>
           <a:xfrm>
-            <a:off x="564429" y="983430"/>
-            <a:ext cx="8758680" cy="5576219"/>
-            <a:chOff x="564429" y="983430"/>
-            <a:chExt cx="8758680" cy="5576219"/>
+            <a:off x="0" y="-1"/>
+            <a:ext cx="9496425" cy="4592021"/>
           </a:xfrm>
-        </p:grpSpPr>
-        <p:pic>
-          <p:nvPicPr>
-            <p:cNvPr id="5" name="Imagen 4">
-              <a:extLst>
-                <a:ext uri="{FF2B5EF4-FFF2-40B4-BE49-F238E27FC236}">
-                  <a16:creationId xmlns:a16="http://schemas.microsoft.com/office/drawing/2014/main" id="{10D90007-1AD4-75D0-3719-5732F18CA8BD}"/>
-                </a:ext>
-              </a:extLst>
-            </p:cNvPr>
-            <p:cNvPicPr>
-              <a:picLocks noChangeAspect="1"/>
-            </p:cNvPicPr>
-            <p:nvPr/>
-          </p:nvPicPr>
-          <p:blipFill>
-            <a:blip r:embed="rId2">
-              <a:extLst>
-                <a:ext uri="{28A0092B-C50C-407E-A947-70E740481C1C}">
-                  <a14:useLocalDpi xmlns:a14="http://schemas.microsoft.com/office/drawing/2010/main" val="0"/>
-                </a:ext>
-              </a:extLst>
-            </a:blip>
-            <a:stretch>
-              <a:fillRect/>
-            </a:stretch>
-          </p:blipFill>
-          <p:spPr>
-            <a:xfrm>
-              <a:off x="564429" y="983431"/>
-              <a:ext cx="8758680" cy="5576218"/>
-            </a:xfrm>
-            <a:prstGeom prst="rect">
-              <a:avLst/>
-            </a:prstGeom>
-          </p:spPr>
-        </p:pic>
-        <p:sp>
-          <p:nvSpPr>
-            <p:cNvPr id="6" name="Rectángulo 5">
-              <a:extLst>
-                <a:ext uri="{FF2B5EF4-FFF2-40B4-BE49-F238E27FC236}">
-                  <a16:creationId xmlns:a16="http://schemas.microsoft.com/office/drawing/2014/main" id="{1DD12549-9998-EB64-E41E-1A678FBAA811}"/>
-                </a:ext>
-              </a:extLst>
-            </p:cNvPr>
-            <p:cNvSpPr/>
-            <p:nvPr/>
-          </p:nvSpPr>
-          <p:spPr>
-            <a:xfrm>
-              <a:off x="564429" y="983430"/>
-              <a:ext cx="8758680" cy="5576217"/>
-            </a:xfrm>
-            <a:prstGeom prst="rect">
-              <a:avLst/>
-            </a:prstGeom>
-            <a:solidFill>
-              <a:schemeClr val="dk1">
-                <a:alpha val="58000"/>
-              </a:schemeClr>
-            </a:solidFill>
-            <a:ln>
-              <a:noFill/>
-            </a:ln>
-          </p:spPr>
-          <p:style>
-            <a:lnRef idx="2">
-              <a:schemeClr val="dk1">
-                <a:shade val="15000"/>
-              </a:schemeClr>
-            </a:lnRef>
-            <a:fillRef idx="1">
-              <a:schemeClr val="dk1"/>
-            </a:fillRef>
-            <a:effectRef idx="0">
-              <a:schemeClr val="dk1"/>
-            </a:effectRef>
-            <a:fontRef idx="minor">
-              <a:schemeClr val="lt1"/>
-            </a:fontRef>
-          </p:style>
-          <p:txBody>
-            <a:bodyPr rtlCol="0" anchor="ctr"/>
-            <a:lstStyle/>
-            <a:p>
-              <a:pPr algn="ctr"/>
-              <a:endParaRPr lang="es-ES"/>
-            </a:p>
-          </p:txBody>
-        </p:sp>
-      </p:grpSp>
+          <a:prstGeom prst="rect">
+            <a:avLst/>
+          </a:prstGeom>
+        </p:spPr>
+      </p:pic>
     </p:spTree>
     <p:extLst>
       <p:ext uri="{BB962C8B-B14F-4D97-AF65-F5344CB8AC3E}">
-        <p14:creationId xmlns:p14="http://schemas.microsoft.com/office/powerpoint/2010/main" val="1692305363"/>
+        <p14:creationId xmlns:p14="http://schemas.microsoft.com/office/powerpoint/2010/main" val="3449742779"/>
       </p:ext>
     </p:extLst>
   </p:cSld>

</xml_diff>

<commit_message>
Logo - Sistema de Control Educativo - Nuevo Readme
</commit_message>
<xml_diff>
--- a/static/img/UESJ.pptx
+++ b/static/img/UESJ.pptx
@@ -282,7 +282,7 @@
           <a:p>
             <a:fld id="{61C0A7A1-1656-4159-BA00-B5D52E614300}" type="datetimeFigureOut">
               <a:rPr lang="es-ES" smtClean="0"/>
-              <a:t>25/06/2024</a:t>
+              <a:t>29/06/2024</a:t>
             </a:fld>
             <a:endParaRPr lang="es-ES"/>
           </a:p>
@@ -480,7 +480,7 @@
           <a:p>
             <a:fld id="{61C0A7A1-1656-4159-BA00-B5D52E614300}" type="datetimeFigureOut">
               <a:rPr lang="es-ES" smtClean="0"/>
-              <a:t>25/06/2024</a:t>
+              <a:t>29/06/2024</a:t>
             </a:fld>
             <a:endParaRPr lang="es-ES"/>
           </a:p>
@@ -688,7 +688,7 @@
           <a:p>
             <a:fld id="{61C0A7A1-1656-4159-BA00-B5D52E614300}" type="datetimeFigureOut">
               <a:rPr lang="es-ES" smtClean="0"/>
-              <a:t>25/06/2024</a:t>
+              <a:t>29/06/2024</a:t>
             </a:fld>
             <a:endParaRPr lang="es-ES"/>
           </a:p>
@@ -886,7 +886,7 @@
           <a:p>
             <a:fld id="{61C0A7A1-1656-4159-BA00-B5D52E614300}" type="datetimeFigureOut">
               <a:rPr lang="es-ES" smtClean="0"/>
-              <a:t>25/06/2024</a:t>
+              <a:t>29/06/2024</a:t>
             </a:fld>
             <a:endParaRPr lang="es-ES"/>
           </a:p>
@@ -1161,7 +1161,7 @@
           <a:p>
             <a:fld id="{61C0A7A1-1656-4159-BA00-B5D52E614300}" type="datetimeFigureOut">
               <a:rPr lang="es-ES" smtClean="0"/>
-              <a:t>25/06/2024</a:t>
+              <a:t>29/06/2024</a:t>
             </a:fld>
             <a:endParaRPr lang="es-ES"/>
           </a:p>
@@ -1426,7 +1426,7 @@
           <a:p>
             <a:fld id="{61C0A7A1-1656-4159-BA00-B5D52E614300}" type="datetimeFigureOut">
               <a:rPr lang="es-ES" smtClean="0"/>
-              <a:t>25/06/2024</a:t>
+              <a:t>29/06/2024</a:t>
             </a:fld>
             <a:endParaRPr lang="es-ES"/>
           </a:p>
@@ -1838,7 +1838,7 @@
           <a:p>
             <a:fld id="{61C0A7A1-1656-4159-BA00-B5D52E614300}" type="datetimeFigureOut">
               <a:rPr lang="es-ES" smtClean="0"/>
-              <a:t>25/06/2024</a:t>
+              <a:t>29/06/2024</a:t>
             </a:fld>
             <a:endParaRPr lang="es-ES"/>
           </a:p>
@@ -1979,7 +1979,7 @@
           <a:p>
             <a:fld id="{61C0A7A1-1656-4159-BA00-B5D52E614300}" type="datetimeFigureOut">
               <a:rPr lang="es-ES" smtClean="0"/>
-              <a:t>25/06/2024</a:t>
+              <a:t>29/06/2024</a:t>
             </a:fld>
             <a:endParaRPr lang="es-ES"/>
           </a:p>
@@ -2092,7 +2092,7 @@
           <a:p>
             <a:fld id="{61C0A7A1-1656-4159-BA00-B5D52E614300}" type="datetimeFigureOut">
               <a:rPr lang="es-ES" smtClean="0"/>
-              <a:t>25/06/2024</a:t>
+              <a:t>29/06/2024</a:t>
             </a:fld>
             <a:endParaRPr lang="es-ES"/>
           </a:p>
@@ -2403,7 +2403,7 @@
           <a:p>
             <a:fld id="{61C0A7A1-1656-4159-BA00-B5D52E614300}" type="datetimeFigureOut">
               <a:rPr lang="es-ES" smtClean="0"/>
-              <a:t>25/06/2024</a:t>
+              <a:t>29/06/2024</a:t>
             </a:fld>
             <a:endParaRPr lang="es-ES"/>
           </a:p>
@@ -2691,7 +2691,7 @@
           <a:p>
             <a:fld id="{61C0A7A1-1656-4159-BA00-B5D52E614300}" type="datetimeFigureOut">
               <a:rPr lang="es-ES" smtClean="0"/>
-              <a:t>25/06/2024</a:t>
+              <a:t>29/06/2024</a:t>
             </a:fld>
             <a:endParaRPr lang="es-ES"/>
           </a:p>
@@ -2932,7 +2932,7 @@
           <a:p>
             <a:fld id="{61C0A7A1-1656-4159-BA00-B5D52E614300}" type="datetimeFigureOut">
               <a:rPr lang="es-ES" smtClean="0"/>
-              <a:t>25/06/2024</a:t>
+              <a:t>29/06/2024</a:t>
             </a:fld>
             <a:endParaRPr lang="es-ES"/>
           </a:p>
@@ -5286,6 +5286,35 @@
           <a:chExt cx="0" cy="0"/>
         </a:xfrm>
       </p:grpSpPr>
+      <p:pic>
+        <p:nvPicPr>
+          <p:cNvPr id="3" name="Imagen 2">
+            <a:extLst>
+              <a:ext uri="{FF2B5EF4-FFF2-40B4-BE49-F238E27FC236}">
+                <a16:creationId xmlns:a16="http://schemas.microsoft.com/office/drawing/2014/main" id="{EB679FE1-2E1B-2E7B-8EDB-D494CDE2471B}"/>
+              </a:ext>
+            </a:extLst>
+          </p:cNvPr>
+          <p:cNvPicPr>
+            <a:picLocks noChangeAspect="1"/>
+          </p:cNvPicPr>
+          <p:nvPr/>
+        </p:nvPicPr>
+        <p:blipFill rotWithShape="1">
+          <a:blip r:embed="rId2"/>
+          <a:srcRect l="773" t="10633"/>
+          <a:stretch/>
+        </p:blipFill>
+        <p:spPr>
+          <a:xfrm>
+            <a:off x="94268" y="876693"/>
+            <a:ext cx="12097732" cy="5793982"/>
+          </a:xfrm>
+          <a:prstGeom prst="rect">
+            <a:avLst/>
+          </a:prstGeom>
+        </p:spPr>
+      </p:pic>
     </p:spTree>
     <p:extLst>
       <p:ext uri="{BB962C8B-B14F-4D97-AF65-F5344CB8AC3E}">

</xml_diff>